<commit_message>
add ZF.pptx edit cantor russell halting
</commit_message>
<xml_diff>
--- a/spring15/slidesS15/russell-paradox.pptx
+++ b/spring15/slidesS15/russell-paradox.pptx
@@ -5,10 +5,10 @@
     <p:sldMasterId id="2147483650" r:id="rId1"/>
   </p:sldMasterIdLst>
   <p:notesMasterIdLst>
-    <p:notesMasterId r:id="rId31"/>
+    <p:notesMasterId r:id="rId21"/>
   </p:notesMasterIdLst>
   <p:handoutMasterIdLst>
-    <p:handoutMasterId r:id="rId32"/>
+    <p:handoutMasterId r:id="rId22"/>
   </p:handoutMasterIdLst>
   <p:sldIdLst>
     <p:sldId id="257" r:id="rId2"/>
@@ -30,21 +30,11 @@
     <p:sldId id="371" r:id="rId18"/>
     <p:sldId id="372" r:id="rId19"/>
     <p:sldId id="374" r:id="rId20"/>
-    <p:sldId id="366" r:id="rId21"/>
-    <p:sldId id="397" r:id="rId22"/>
-    <p:sldId id="400" r:id="rId23"/>
-    <p:sldId id="396" r:id="rId24"/>
-    <p:sldId id="375" r:id="rId25"/>
-    <p:sldId id="401" r:id="rId26"/>
-    <p:sldId id="402" r:id="rId27"/>
-    <p:sldId id="403" r:id="rId28"/>
-    <p:sldId id="404" r:id="rId29"/>
-    <p:sldId id="376" r:id="rId30"/>
   </p:sldIdLst>
   <p:sldSz cx="9144000" cy="6858000" type="screen4x3"/>
   <p:notesSz cx="9601200" cy="7315200"/>
   <p:custDataLst>
-    <p:tags r:id="rId34"/>
+    <p:tags r:id="rId24"/>
   </p:custDataLst>
   <p:defaultTextStyle>
     <a:defPPr>
@@ -1707,91 +1697,6 @@
 </p:notes>
 </file>
 
-<file path=ppt/notesSlides/notesSlide19.xml><?xml version="1.0" encoding="utf-8"?>
-<p:notes xmlns:a="http://schemas.openxmlformats.org/drawingml/2006/main" xmlns:r="http://schemas.openxmlformats.org/officeDocument/2006/relationships" xmlns:p="http://schemas.openxmlformats.org/presentationml/2006/main">
-  <p:cSld>
-    <p:spTree>
-      <p:nvGrpSpPr>
-        <p:cNvPr id="1" name=""/>
-        <p:cNvGrpSpPr/>
-        <p:nvPr/>
-      </p:nvGrpSpPr>
-      <p:grpSpPr>
-        <a:xfrm>
-          <a:off x="0" y="0"/>
-          <a:ext cx="0" cy="0"/>
-          <a:chOff x="0" y="0"/>
-          <a:chExt cx="0" cy="0"/>
-        </a:xfrm>
-      </p:grpSpPr>
-      <p:sp>
-        <p:nvSpPr>
-          <p:cNvPr id="2" name="Slide Image Placeholder 1"/>
-          <p:cNvSpPr>
-            <a:spLocks noGrp="1" noRot="1" noChangeAspect="1"/>
-          </p:cNvSpPr>
-          <p:nvPr>
-            <p:ph type="sldImg"/>
-          </p:nvPr>
-        </p:nvSpPr>
-        <p:spPr/>
-      </p:sp>
-      <p:sp>
-        <p:nvSpPr>
-          <p:cNvPr id="3" name="Notes Placeholder 2"/>
-          <p:cNvSpPr>
-            <a:spLocks noGrp="1"/>
-          </p:cNvSpPr>
-          <p:nvPr>
-            <p:ph type="body" idx="1"/>
-          </p:nvPr>
-        </p:nvSpPr>
-        <p:spPr/>
-        <p:txBody>
-          <a:bodyPr/>
-          <a:lstStyle/>
-          <a:p>
-            <a:endParaRPr lang="en-US"/>
-          </a:p>
-        </p:txBody>
-      </p:sp>
-      <p:sp>
-        <p:nvSpPr>
-          <p:cNvPr id="4" name="Slide Number Placeholder 3"/>
-          <p:cNvSpPr>
-            <a:spLocks noGrp="1"/>
-          </p:cNvSpPr>
-          <p:nvPr>
-            <p:ph type="sldNum" sz="quarter" idx="10"/>
-          </p:nvPr>
-        </p:nvSpPr>
-        <p:spPr/>
-        <p:txBody>
-          <a:bodyPr/>
-          <a:lstStyle/>
-          <a:p>
-            <a:fld id="{A02B9F3F-3042-489F-AF35-1A733968F079}" type="slidenum">
-              <a:rPr lang="en-US" smtClean="0"/>
-              <a:pPr/>
-              <a:t>20</a:t>
-            </a:fld>
-            <a:endParaRPr lang="en-US" dirty="0"/>
-          </a:p>
-        </p:txBody>
-      </p:sp>
-    </p:spTree>
-    <p:extLst>
-      <p:ext uri="{BB962C8B-B14F-4D97-AF65-F5344CB8AC3E}">
-        <p14:creationId xmlns:p14="http://schemas.microsoft.com/office/powerpoint/2010/main" val="1597003377"/>
-      </p:ext>
-    </p:extLst>
-  </p:cSld>
-  <p:clrMapOvr>
-    <a:masterClrMapping/>
-  </p:clrMapOvr>
-</p:notes>
-</file>
-
 <file path=ppt/notesSlides/notesSlide2.xml><?xml version="1.0" encoding="utf-8"?>
 <p:notes xmlns:a="http://schemas.openxmlformats.org/drawingml/2006/main" xmlns:r="http://schemas.openxmlformats.org/officeDocument/2006/relationships" xmlns:p="http://schemas.openxmlformats.org/presentationml/2006/main">
   <p:cSld>
@@ -1870,775 +1775,6 @@
         <p14:creationId xmlns:p14="http://schemas.microsoft.com/office/powerpoint/2010/main" val="3172855092"/>
       </p:ext>
     </p:extLst>
-  </p:cSld>
-  <p:clrMapOvr>
-    <a:masterClrMapping/>
-  </p:clrMapOvr>
-</p:notes>
-</file>
-
-<file path=ppt/notesSlides/notesSlide20.xml><?xml version="1.0" encoding="utf-8"?>
-<p:notes xmlns:a="http://schemas.openxmlformats.org/drawingml/2006/main" xmlns:r="http://schemas.openxmlformats.org/officeDocument/2006/relationships" xmlns:p="http://schemas.openxmlformats.org/presentationml/2006/main">
-  <p:cSld>
-    <p:spTree>
-      <p:nvGrpSpPr>
-        <p:cNvPr id="1" name=""/>
-        <p:cNvGrpSpPr/>
-        <p:nvPr/>
-      </p:nvGrpSpPr>
-      <p:grpSpPr>
-        <a:xfrm>
-          <a:off x="0" y="0"/>
-          <a:ext cx="0" cy="0"/>
-          <a:chOff x="0" y="0"/>
-          <a:chExt cx="0" cy="0"/>
-        </a:xfrm>
-      </p:grpSpPr>
-      <p:sp>
-        <p:nvSpPr>
-          <p:cNvPr id="2" name="Slide Image Placeholder 1"/>
-          <p:cNvSpPr>
-            <a:spLocks noGrp="1" noRot="1" noChangeAspect="1"/>
-          </p:cNvSpPr>
-          <p:nvPr>
-            <p:ph type="sldImg"/>
-          </p:nvPr>
-        </p:nvSpPr>
-        <p:spPr/>
-      </p:sp>
-      <p:sp>
-        <p:nvSpPr>
-          <p:cNvPr id="3" name="Notes Placeholder 2"/>
-          <p:cNvSpPr>
-            <a:spLocks noGrp="1"/>
-          </p:cNvSpPr>
-          <p:nvPr>
-            <p:ph type="body" idx="1"/>
-          </p:nvPr>
-        </p:nvSpPr>
-        <p:spPr/>
-        <p:txBody>
-          <a:bodyPr/>
-          <a:lstStyle/>
-          <a:p>
-            <a:endParaRPr lang="en-US"/>
-          </a:p>
-        </p:txBody>
-      </p:sp>
-      <p:sp>
-        <p:nvSpPr>
-          <p:cNvPr id="4" name="Slide Number Placeholder 3"/>
-          <p:cNvSpPr>
-            <a:spLocks noGrp="1"/>
-          </p:cNvSpPr>
-          <p:nvPr>
-            <p:ph type="sldNum" sz="quarter" idx="10"/>
-          </p:nvPr>
-        </p:nvSpPr>
-        <p:spPr/>
-        <p:txBody>
-          <a:bodyPr/>
-          <a:lstStyle/>
-          <a:p>
-            <a:fld id="{A02B9F3F-3042-489F-AF35-1A733968F079}" type="slidenum">
-              <a:rPr lang="en-US" smtClean="0"/>
-              <a:pPr/>
-              <a:t>21</a:t>
-            </a:fld>
-            <a:endParaRPr lang="en-US" dirty="0"/>
-          </a:p>
-        </p:txBody>
-      </p:sp>
-    </p:spTree>
-    <p:extLst>
-      <p:ext uri="{BB962C8B-B14F-4D97-AF65-F5344CB8AC3E}">
-        <p14:creationId xmlns:p14="http://schemas.microsoft.com/office/powerpoint/2010/main" val="1597003377"/>
-      </p:ext>
-    </p:extLst>
-  </p:cSld>
-  <p:clrMapOvr>
-    <a:masterClrMapping/>
-  </p:clrMapOvr>
-</p:notes>
-</file>
-
-<file path=ppt/notesSlides/notesSlide21.xml><?xml version="1.0" encoding="utf-8"?>
-<p:notes xmlns:a="http://schemas.openxmlformats.org/drawingml/2006/main" xmlns:r="http://schemas.openxmlformats.org/officeDocument/2006/relationships" xmlns:p="http://schemas.openxmlformats.org/presentationml/2006/main">
-  <p:cSld>
-    <p:spTree>
-      <p:nvGrpSpPr>
-        <p:cNvPr id="1" name=""/>
-        <p:cNvGrpSpPr/>
-        <p:nvPr/>
-      </p:nvGrpSpPr>
-      <p:grpSpPr>
-        <a:xfrm>
-          <a:off x="0" y="0"/>
-          <a:ext cx="0" cy="0"/>
-          <a:chOff x="0" y="0"/>
-          <a:chExt cx="0" cy="0"/>
-        </a:xfrm>
-      </p:grpSpPr>
-      <p:sp>
-        <p:nvSpPr>
-          <p:cNvPr id="2" name="Slide Image Placeholder 1"/>
-          <p:cNvSpPr>
-            <a:spLocks noGrp="1" noRot="1" noChangeAspect="1"/>
-          </p:cNvSpPr>
-          <p:nvPr>
-            <p:ph type="sldImg"/>
-          </p:nvPr>
-        </p:nvSpPr>
-        <p:spPr/>
-      </p:sp>
-      <p:sp>
-        <p:nvSpPr>
-          <p:cNvPr id="3" name="Notes Placeholder 2"/>
-          <p:cNvSpPr>
-            <a:spLocks noGrp="1"/>
-          </p:cNvSpPr>
-          <p:nvPr>
-            <p:ph type="body" idx="1"/>
-          </p:nvPr>
-        </p:nvSpPr>
-        <p:spPr/>
-        <p:txBody>
-          <a:bodyPr/>
-          <a:lstStyle/>
-          <a:p>
-            <a:endParaRPr lang="en-US"/>
-          </a:p>
-        </p:txBody>
-      </p:sp>
-      <p:sp>
-        <p:nvSpPr>
-          <p:cNvPr id="4" name="Slide Number Placeholder 3"/>
-          <p:cNvSpPr>
-            <a:spLocks noGrp="1"/>
-          </p:cNvSpPr>
-          <p:nvPr>
-            <p:ph type="sldNum" sz="quarter" idx="10"/>
-          </p:nvPr>
-        </p:nvSpPr>
-        <p:spPr/>
-        <p:txBody>
-          <a:bodyPr/>
-          <a:lstStyle/>
-          <a:p>
-            <a:fld id="{A02B9F3F-3042-489F-AF35-1A733968F079}" type="slidenum">
-              <a:rPr lang="en-US" smtClean="0"/>
-              <a:pPr/>
-              <a:t>22</a:t>
-            </a:fld>
-            <a:endParaRPr lang="en-US" dirty="0"/>
-          </a:p>
-        </p:txBody>
-      </p:sp>
-    </p:spTree>
-    <p:extLst>
-      <p:ext uri="{BB962C8B-B14F-4D97-AF65-F5344CB8AC3E}">
-        <p14:creationId xmlns:p14="http://schemas.microsoft.com/office/powerpoint/2010/main" val="1597003377"/>
-      </p:ext>
-    </p:extLst>
-  </p:cSld>
-  <p:clrMapOvr>
-    <a:masterClrMapping/>
-  </p:clrMapOvr>
-</p:notes>
-</file>
-
-<file path=ppt/notesSlides/notesSlide22.xml><?xml version="1.0" encoding="utf-8"?>
-<p:notes xmlns:a="http://schemas.openxmlformats.org/drawingml/2006/main" xmlns:r="http://schemas.openxmlformats.org/officeDocument/2006/relationships" xmlns:p="http://schemas.openxmlformats.org/presentationml/2006/main">
-  <p:cSld>
-    <p:spTree>
-      <p:nvGrpSpPr>
-        <p:cNvPr id="1" name=""/>
-        <p:cNvGrpSpPr/>
-        <p:nvPr/>
-      </p:nvGrpSpPr>
-      <p:grpSpPr>
-        <a:xfrm>
-          <a:off x="0" y="0"/>
-          <a:ext cx="0" cy="0"/>
-          <a:chOff x="0" y="0"/>
-          <a:chExt cx="0" cy="0"/>
-        </a:xfrm>
-      </p:grpSpPr>
-      <p:sp>
-        <p:nvSpPr>
-          <p:cNvPr id="2" name="Slide Image Placeholder 1"/>
-          <p:cNvSpPr>
-            <a:spLocks noGrp="1" noRot="1" noChangeAspect="1"/>
-          </p:cNvSpPr>
-          <p:nvPr>
-            <p:ph type="sldImg"/>
-          </p:nvPr>
-        </p:nvSpPr>
-        <p:spPr/>
-      </p:sp>
-      <p:sp>
-        <p:nvSpPr>
-          <p:cNvPr id="3" name="Notes Placeholder 2"/>
-          <p:cNvSpPr>
-            <a:spLocks noGrp="1"/>
-          </p:cNvSpPr>
-          <p:nvPr>
-            <p:ph type="body" idx="1"/>
-          </p:nvPr>
-        </p:nvSpPr>
-        <p:spPr/>
-        <p:txBody>
-          <a:bodyPr/>
-          <a:lstStyle/>
-          <a:p>
-            <a:endParaRPr lang="en-US"/>
-          </a:p>
-        </p:txBody>
-      </p:sp>
-      <p:sp>
-        <p:nvSpPr>
-          <p:cNvPr id="4" name="Slide Number Placeholder 3"/>
-          <p:cNvSpPr>
-            <a:spLocks noGrp="1"/>
-          </p:cNvSpPr>
-          <p:nvPr>
-            <p:ph type="sldNum" sz="quarter" idx="10"/>
-          </p:nvPr>
-        </p:nvSpPr>
-        <p:spPr/>
-        <p:txBody>
-          <a:bodyPr/>
-          <a:lstStyle/>
-          <a:p>
-            <a:fld id="{A02B9F3F-3042-489F-AF35-1A733968F079}" type="slidenum">
-              <a:rPr lang="en-US" smtClean="0"/>
-              <a:pPr/>
-              <a:t>23</a:t>
-            </a:fld>
-            <a:endParaRPr lang="en-US" dirty="0"/>
-          </a:p>
-        </p:txBody>
-      </p:sp>
-    </p:spTree>
-    <p:extLst>
-      <p:ext uri="{BB962C8B-B14F-4D97-AF65-F5344CB8AC3E}">
-        <p14:creationId xmlns:p14="http://schemas.microsoft.com/office/powerpoint/2010/main" val="1597003377"/>
-      </p:ext>
-    </p:extLst>
-  </p:cSld>
-  <p:clrMapOvr>
-    <a:masterClrMapping/>
-  </p:clrMapOvr>
-</p:notes>
-</file>
-
-<file path=ppt/notesSlides/notesSlide23.xml><?xml version="1.0" encoding="utf-8"?>
-<p:notes xmlns:a="http://schemas.openxmlformats.org/drawingml/2006/main" xmlns:r="http://schemas.openxmlformats.org/officeDocument/2006/relationships" xmlns:p="http://schemas.openxmlformats.org/presentationml/2006/main">
-  <p:cSld>
-    <p:spTree>
-      <p:nvGrpSpPr>
-        <p:cNvPr id="1" name=""/>
-        <p:cNvGrpSpPr/>
-        <p:nvPr/>
-      </p:nvGrpSpPr>
-      <p:grpSpPr>
-        <a:xfrm>
-          <a:off x="0" y="0"/>
-          <a:ext cx="0" cy="0"/>
-          <a:chOff x="0" y="0"/>
-          <a:chExt cx="0" cy="0"/>
-        </a:xfrm>
-      </p:grpSpPr>
-      <p:sp>
-        <p:nvSpPr>
-          <p:cNvPr id="2" name="Slide Image Placeholder 1"/>
-          <p:cNvSpPr>
-            <a:spLocks noGrp="1" noRot="1" noChangeAspect="1"/>
-          </p:cNvSpPr>
-          <p:nvPr>
-            <p:ph type="sldImg"/>
-          </p:nvPr>
-        </p:nvSpPr>
-        <p:spPr>
-          <a:xfrm>
-            <a:off x="2971800" y="549275"/>
-            <a:ext cx="3657600" cy="2743200"/>
-          </a:xfrm>
-        </p:spPr>
-      </p:sp>
-      <p:sp>
-        <p:nvSpPr>
-          <p:cNvPr id="3" name="Notes Placeholder 2"/>
-          <p:cNvSpPr>
-            <a:spLocks noGrp="1"/>
-          </p:cNvSpPr>
-          <p:nvPr>
-            <p:ph type="body" idx="1"/>
-          </p:nvPr>
-        </p:nvSpPr>
-        <p:spPr/>
-        <p:txBody>
-          <a:bodyPr>
-            <a:normAutofit/>
-          </a:bodyPr>
-          <a:lstStyle/>
-          <a:p>
-            <a:endParaRPr lang="en-US" dirty="0"/>
-          </a:p>
-        </p:txBody>
-      </p:sp>
-      <p:sp>
-        <p:nvSpPr>
-          <p:cNvPr id="4" name="Slide Number Placeholder 3"/>
-          <p:cNvSpPr>
-            <a:spLocks noGrp="1"/>
-          </p:cNvSpPr>
-          <p:nvPr>
-            <p:ph type="sldNum" sz="quarter" idx="10"/>
-          </p:nvPr>
-        </p:nvSpPr>
-        <p:spPr/>
-        <p:txBody>
-          <a:bodyPr/>
-          <a:lstStyle/>
-          <a:p>
-            <a:fld id="{A02B9F3F-3042-489F-AF35-1A733968F079}" type="slidenum">
-              <a:rPr lang="en-US" smtClean="0"/>
-              <a:pPr/>
-              <a:t>24</a:t>
-            </a:fld>
-            <a:endParaRPr lang="en-US" dirty="0"/>
-          </a:p>
-        </p:txBody>
-      </p:sp>
-    </p:spTree>
-  </p:cSld>
-  <p:clrMapOvr>
-    <a:masterClrMapping/>
-  </p:clrMapOvr>
-</p:notes>
-</file>
-
-<file path=ppt/notesSlides/notesSlide24.xml><?xml version="1.0" encoding="utf-8"?>
-<p:notes xmlns:a="http://schemas.openxmlformats.org/drawingml/2006/main" xmlns:r="http://schemas.openxmlformats.org/officeDocument/2006/relationships" xmlns:p="http://schemas.openxmlformats.org/presentationml/2006/main">
-  <p:cSld>
-    <p:spTree>
-      <p:nvGrpSpPr>
-        <p:cNvPr id="1" name=""/>
-        <p:cNvGrpSpPr/>
-        <p:nvPr/>
-      </p:nvGrpSpPr>
-      <p:grpSpPr>
-        <a:xfrm>
-          <a:off x="0" y="0"/>
-          <a:ext cx="0" cy="0"/>
-          <a:chOff x="0" y="0"/>
-          <a:chExt cx="0" cy="0"/>
-        </a:xfrm>
-      </p:grpSpPr>
-      <p:sp>
-        <p:nvSpPr>
-          <p:cNvPr id="2" name="Slide Image Placeholder 1"/>
-          <p:cNvSpPr>
-            <a:spLocks noGrp="1" noRot="1" noChangeAspect="1"/>
-          </p:cNvSpPr>
-          <p:nvPr>
-            <p:ph type="sldImg"/>
-          </p:nvPr>
-        </p:nvSpPr>
-        <p:spPr/>
-      </p:sp>
-      <p:sp>
-        <p:nvSpPr>
-          <p:cNvPr id="3" name="Notes Placeholder 2"/>
-          <p:cNvSpPr>
-            <a:spLocks noGrp="1"/>
-          </p:cNvSpPr>
-          <p:nvPr>
-            <p:ph type="body" idx="1"/>
-          </p:nvPr>
-        </p:nvSpPr>
-        <p:spPr/>
-        <p:txBody>
-          <a:bodyPr/>
-          <a:lstStyle/>
-          <a:p>
-            <a:endParaRPr lang="en-US"/>
-          </a:p>
-        </p:txBody>
-      </p:sp>
-      <p:sp>
-        <p:nvSpPr>
-          <p:cNvPr id="4" name="Slide Number Placeholder 3"/>
-          <p:cNvSpPr>
-            <a:spLocks noGrp="1"/>
-          </p:cNvSpPr>
-          <p:nvPr>
-            <p:ph type="sldNum" sz="quarter" idx="10"/>
-          </p:nvPr>
-        </p:nvSpPr>
-        <p:spPr/>
-        <p:txBody>
-          <a:bodyPr/>
-          <a:lstStyle/>
-          <a:p>
-            <a:fld id="{A02B9F3F-3042-489F-AF35-1A733968F079}" type="slidenum">
-              <a:rPr lang="en-US" smtClean="0"/>
-              <a:pPr/>
-              <a:t>25</a:t>
-            </a:fld>
-            <a:endParaRPr lang="en-US" dirty="0"/>
-          </a:p>
-        </p:txBody>
-      </p:sp>
-    </p:spTree>
-    <p:extLst>
-      <p:ext uri="{BB962C8B-B14F-4D97-AF65-F5344CB8AC3E}">
-        <p14:creationId xmlns:p14="http://schemas.microsoft.com/office/powerpoint/2010/main" val="1597003377"/>
-      </p:ext>
-    </p:extLst>
-  </p:cSld>
-  <p:clrMapOvr>
-    <a:masterClrMapping/>
-  </p:clrMapOvr>
-</p:notes>
-</file>
-
-<file path=ppt/notesSlides/notesSlide25.xml><?xml version="1.0" encoding="utf-8"?>
-<p:notes xmlns:a="http://schemas.openxmlformats.org/drawingml/2006/main" xmlns:r="http://schemas.openxmlformats.org/officeDocument/2006/relationships" xmlns:p="http://schemas.openxmlformats.org/presentationml/2006/main">
-  <p:cSld>
-    <p:spTree>
-      <p:nvGrpSpPr>
-        <p:cNvPr id="1" name=""/>
-        <p:cNvGrpSpPr/>
-        <p:nvPr/>
-      </p:nvGrpSpPr>
-      <p:grpSpPr>
-        <a:xfrm>
-          <a:off x="0" y="0"/>
-          <a:ext cx="0" cy="0"/>
-          <a:chOff x="0" y="0"/>
-          <a:chExt cx="0" cy="0"/>
-        </a:xfrm>
-      </p:grpSpPr>
-      <p:sp>
-        <p:nvSpPr>
-          <p:cNvPr id="2" name="Slide Image Placeholder 1"/>
-          <p:cNvSpPr>
-            <a:spLocks noGrp="1" noRot="1" noChangeAspect="1"/>
-          </p:cNvSpPr>
-          <p:nvPr>
-            <p:ph type="sldImg"/>
-          </p:nvPr>
-        </p:nvSpPr>
-        <p:spPr/>
-      </p:sp>
-      <p:sp>
-        <p:nvSpPr>
-          <p:cNvPr id="3" name="Notes Placeholder 2"/>
-          <p:cNvSpPr>
-            <a:spLocks noGrp="1"/>
-          </p:cNvSpPr>
-          <p:nvPr>
-            <p:ph type="body" idx="1"/>
-          </p:nvPr>
-        </p:nvSpPr>
-        <p:spPr/>
-        <p:txBody>
-          <a:bodyPr/>
-          <a:lstStyle/>
-          <a:p>
-            <a:endParaRPr lang="en-US"/>
-          </a:p>
-        </p:txBody>
-      </p:sp>
-      <p:sp>
-        <p:nvSpPr>
-          <p:cNvPr id="4" name="Slide Number Placeholder 3"/>
-          <p:cNvSpPr>
-            <a:spLocks noGrp="1"/>
-          </p:cNvSpPr>
-          <p:nvPr>
-            <p:ph type="sldNum" sz="quarter" idx="10"/>
-          </p:nvPr>
-        </p:nvSpPr>
-        <p:spPr/>
-        <p:txBody>
-          <a:bodyPr/>
-          <a:lstStyle/>
-          <a:p>
-            <a:fld id="{A02B9F3F-3042-489F-AF35-1A733968F079}" type="slidenum">
-              <a:rPr lang="en-US" smtClean="0"/>
-              <a:pPr/>
-              <a:t>26</a:t>
-            </a:fld>
-            <a:endParaRPr lang="en-US" dirty="0"/>
-          </a:p>
-        </p:txBody>
-      </p:sp>
-    </p:spTree>
-    <p:extLst>
-      <p:ext uri="{BB962C8B-B14F-4D97-AF65-F5344CB8AC3E}">
-        <p14:creationId xmlns:p14="http://schemas.microsoft.com/office/powerpoint/2010/main" val="1597003377"/>
-      </p:ext>
-    </p:extLst>
-  </p:cSld>
-  <p:clrMapOvr>
-    <a:masterClrMapping/>
-  </p:clrMapOvr>
-</p:notes>
-</file>
-
-<file path=ppt/notesSlides/notesSlide26.xml><?xml version="1.0" encoding="utf-8"?>
-<p:notes xmlns:a="http://schemas.openxmlformats.org/drawingml/2006/main" xmlns:r="http://schemas.openxmlformats.org/officeDocument/2006/relationships" xmlns:p="http://schemas.openxmlformats.org/presentationml/2006/main">
-  <p:cSld>
-    <p:spTree>
-      <p:nvGrpSpPr>
-        <p:cNvPr id="1" name=""/>
-        <p:cNvGrpSpPr/>
-        <p:nvPr/>
-      </p:nvGrpSpPr>
-      <p:grpSpPr>
-        <a:xfrm>
-          <a:off x="0" y="0"/>
-          <a:ext cx="0" cy="0"/>
-          <a:chOff x="0" y="0"/>
-          <a:chExt cx="0" cy="0"/>
-        </a:xfrm>
-      </p:grpSpPr>
-      <p:sp>
-        <p:nvSpPr>
-          <p:cNvPr id="2" name="Slide Image Placeholder 1"/>
-          <p:cNvSpPr>
-            <a:spLocks noGrp="1" noRot="1" noChangeAspect="1"/>
-          </p:cNvSpPr>
-          <p:nvPr>
-            <p:ph type="sldImg"/>
-          </p:nvPr>
-        </p:nvSpPr>
-        <p:spPr/>
-      </p:sp>
-      <p:sp>
-        <p:nvSpPr>
-          <p:cNvPr id="3" name="Notes Placeholder 2"/>
-          <p:cNvSpPr>
-            <a:spLocks noGrp="1"/>
-          </p:cNvSpPr>
-          <p:nvPr>
-            <p:ph type="body" idx="1"/>
-          </p:nvPr>
-        </p:nvSpPr>
-        <p:spPr/>
-        <p:txBody>
-          <a:bodyPr/>
-          <a:lstStyle/>
-          <a:p>
-            <a:endParaRPr lang="en-US"/>
-          </a:p>
-        </p:txBody>
-      </p:sp>
-      <p:sp>
-        <p:nvSpPr>
-          <p:cNvPr id="4" name="Slide Number Placeholder 3"/>
-          <p:cNvSpPr>
-            <a:spLocks noGrp="1"/>
-          </p:cNvSpPr>
-          <p:nvPr>
-            <p:ph type="sldNum" sz="quarter" idx="10"/>
-          </p:nvPr>
-        </p:nvSpPr>
-        <p:spPr/>
-        <p:txBody>
-          <a:bodyPr/>
-          <a:lstStyle/>
-          <a:p>
-            <a:fld id="{A02B9F3F-3042-489F-AF35-1A733968F079}" type="slidenum">
-              <a:rPr lang="en-US" smtClean="0"/>
-              <a:pPr/>
-              <a:t>27</a:t>
-            </a:fld>
-            <a:endParaRPr lang="en-US" dirty="0"/>
-          </a:p>
-        </p:txBody>
-      </p:sp>
-    </p:spTree>
-    <p:extLst>
-      <p:ext uri="{BB962C8B-B14F-4D97-AF65-F5344CB8AC3E}">
-        <p14:creationId xmlns:p14="http://schemas.microsoft.com/office/powerpoint/2010/main" val="1597003377"/>
-      </p:ext>
-    </p:extLst>
-  </p:cSld>
-  <p:clrMapOvr>
-    <a:masterClrMapping/>
-  </p:clrMapOvr>
-</p:notes>
-</file>
-
-<file path=ppt/notesSlides/notesSlide27.xml><?xml version="1.0" encoding="utf-8"?>
-<p:notes xmlns:a="http://schemas.openxmlformats.org/drawingml/2006/main" xmlns:r="http://schemas.openxmlformats.org/officeDocument/2006/relationships" xmlns:p="http://schemas.openxmlformats.org/presentationml/2006/main">
-  <p:cSld>
-    <p:spTree>
-      <p:nvGrpSpPr>
-        <p:cNvPr id="1" name=""/>
-        <p:cNvGrpSpPr/>
-        <p:nvPr/>
-      </p:nvGrpSpPr>
-      <p:grpSpPr>
-        <a:xfrm>
-          <a:off x="0" y="0"/>
-          <a:ext cx="0" cy="0"/>
-          <a:chOff x="0" y="0"/>
-          <a:chExt cx="0" cy="0"/>
-        </a:xfrm>
-      </p:grpSpPr>
-      <p:sp>
-        <p:nvSpPr>
-          <p:cNvPr id="2" name="Slide Image Placeholder 1"/>
-          <p:cNvSpPr>
-            <a:spLocks noGrp="1" noRot="1" noChangeAspect="1"/>
-          </p:cNvSpPr>
-          <p:nvPr>
-            <p:ph type="sldImg"/>
-          </p:nvPr>
-        </p:nvSpPr>
-        <p:spPr/>
-      </p:sp>
-      <p:sp>
-        <p:nvSpPr>
-          <p:cNvPr id="3" name="Notes Placeholder 2"/>
-          <p:cNvSpPr>
-            <a:spLocks noGrp="1"/>
-          </p:cNvSpPr>
-          <p:nvPr>
-            <p:ph type="body" idx="1"/>
-          </p:nvPr>
-        </p:nvSpPr>
-        <p:spPr/>
-        <p:txBody>
-          <a:bodyPr/>
-          <a:lstStyle/>
-          <a:p>
-            <a:endParaRPr lang="en-US"/>
-          </a:p>
-        </p:txBody>
-      </p:sp>
-      <p:sp>
-        <p:nvSpPr>
-          <p:cNvPr id="4" name="Slide Number Placeholder 3"/>
-          <p:cNvSpPr>
-            <a:spLocks noGrp="1"/>
-          </p:cNvSpPr>
-          <p:nvPr>
-            <p:ph type="sldNum" sz="quarter" idx="10"/>
-          </p:nvPr>
-        </p:nvSpPr>
-        <p:spPr/>
-        <p:txBody>
-          <a:bodyPr/>
-          <a:lstStyle/>
-          <a:p>
-            <a:fld id="{A02B9F3F-3042-489F-AF35-1A733968F079}" type="slidenum">
-              <a:rPr lang="en-US" smtClean="0"/>
-              <a:pPr/>
-              <a:t>28</a:t>
-            </a:fld>
-            <a:endParaRPr lang="en-US" dirty="0"/>
-          </a:p>
-        </p:txBody>
-      </p:sp>
-    </p:spTree>
-    <p:extLst>
-      <p:ext uri="{BB962C8B-B14F-4D97-AF65-F5344CB8AC3E}">
-        <p14:creationId xmlns:p14="http://schemas.microsoft.com/office/powerpoint/2010/main" val="1597003377"/>
-      </p:ext>
-    </p:extLst>
-  </p:cSld>
-  <p:clrMapOvr>
-    <a:masterClrMapping/>
-  </p:clrMapOvr>
-</p:notes>
-</file>
-
-<file path=ppt/notesSlides/notesSlide28.xml><?xml version="1.0" encoding="utf-8"?>
-<p:notes xmlns:a="http://schemas.openxmlformats.org/drawingml/2006/main" xmlns:r="http://schemas.openxmlformats.org/officeDocument/2006/relationships" xmlns:p="http://schemas.openxmlformats.org/presentationml/2006/main">
-  <p:cSld>
-    <p:spTree>
-      <p:nvGrpSpPr>
-        <p:cNvPr id="1" name=""/>
-        <p:cNvGrpSpPr/>
-        <p:nvPr/>
-      </p:nvGrpSpPr>
-      <p:grpSpPr>
-        <a:xfrm>
-          <a:off x="0" y="0"/>
-          <a:ext cx="0" cy="0"/>
-          <a:chOff x="0" y="0"/>
-          <a:chExt cx="0" cy="0"/>
-        </a:xfrm>
-      </p:grpSpPr>
-      <p:sp>
-        <p:nvSpPr>
-          <p:cNvPr id="2" name="Slide Image Placeholder 1"/>
-          <p:cNvSpPr>
-            <a:spLocks noGrp="1" noRot="1" noChangeAspect="1"/>
-          </p:cNvSpPr>
-          <p:nvPr>
-            <p:ph type="sldImg"/>
-          </p:nvPr>
-        </p:nvSpPr>
-        <p:spPr>
-          <a:xfrm>
-            <a:off x="2971800" y="549275"/>
-            <a:ext cx="3657600" cy="2743200"/>
-          </a:xfrm>
-        </p:spPr>
-      </p:sp>
-      <p:sp>
-        <p:nvSpPr>
-          <p:cNvPr id="3" name="Notes Placeholder 2"/>
-          <p:cNvSpPr>
-            <a:spLocks noGrp="1"/>
-          </p:cNvSpPr>
-          <p:nvPr>
-            <p:ph type="body" idx="1"/>
-          </p:nvPr>
-        </p:nvSpPr>
-        <p:spPr/>
-        <p:txBody>
-          <a:bodyPr>
-            <a:normAutofit/>
-          </a:bodyPr>
-          <a:lstStyle/>
-          <a:p>
-            <a:endParaRPr lang="en-US" dirty="0"/>
-          </a:p>
-        </p:txBody>
-      </p:sp>
-      <p:sp>
-        <p:nvSpPr>
-          <p:cNvPr id="4" name="Slide Number Placeholder 3"/>
-          <p:cNvSpPr>
-            <a:spLocks noGrp="1"/>
-          </p:cNvSpPr>
-          <p:nvPr>
-            <p:ph type="sldNum" sz="quarter" idx="10"/>
-          </p:nvPr>
-        </p:nvSpPr>
-        <p:spPr/>
-        <p:txBody>
-          <a:bodyPr/>
-          <a:lstStyle/>
-          <a:p>
-            <a:fld id="{A02B9F3F-3042-489F-AF35-1A733968F079}" type="slidenum">
-              <a:rPr lang="en-US" smtClean="0"/>
-              <a:pPr/>
-              <a:t>29</a:t>
-            </a:fld>
-            <a:endParaRPr lang="en-US" dirty="0"/>
-          </a:p>
-        </p:txBody>
-      </p:sp>
-    </p:spTree>
   </p:cSld>
   <p:clrMapOvr>
     <a:masterClrMapping/>
@@ -4254,7 +3390,23 @@
                 <a:latin typeface="Comic Sans MS" pitchFamily="66" charset="0"/>
                 <a:cs typeface="Comic Sans MS"/>
               </a:rPr>
-              <a:t>Albert R Meyer,      March 4, 2013</a:t>
+              <a:t>Albert R Meyer,      March 4</a:t>
+            </a:r>
+            <a:r>
+              <a:rPr kumimoji="0" lang="en-US" sz="1200" b="0" i="0" u="none" strike="noStrike" kern="1200" cap="none" spc="0" normalizeH="0" baseline="0" noProof="0" smtClean="0">
+                <a:ln>
+                  <a:noFill/>
+                </a:ln>
+                <a:solidFill>
+                  <a:schemeClr val="tx1"/>
+                </a:solidFill>
+                <a:effectLst/>
+                <a:uLnTx/>
+                <a:uFillTx/>
+                <a:latin typeface="Comic Sans MS" pitchFamily="66" charset="0"/>
+                <a:cs typeface="Comic Sans MS"/>
+              </a:rPr>
+              <a:t>, 2015</a:t>
             </a:r>
             <a:endParaRPr kumimoji="0" lang="en-US" sz="1200" b="0" i="0" u="none" strike="noStrike" kern="1200" cap="none" spc="0" normalizeH="0" baseline="0" noProof="0" dirty="0">
               <a:ln>
@@ -4873,8 +4025,54 @@
                 <a:ea typeface="+mj-ea"/>
                 <a:cs typeface="Comic Sans MS"/>
               </a:rPr>
-              <a:t>Set Theory </a:t>
-            </a:r>
+              <a:t>Set </a:t>
+            </a:r>
+            <a:r>
+              <a:rPr lang="en-US" sz="8000" kern="0" dirty="0" smtClean="0">
+                <a:solidFill>
+                  <a:schemeClr val="tx2"/>
+                </a:solidFill>
+                <a:latin typeface="Comic Sans MS" pitchFamily="66" charset="0"/>
+                <a:ea typeface="+mj-ea"/>
+                <a:cs typeface="Comic Sans MS"/>
+              </a:rPr>
+              <a:t>Theory:</a:t>
+            </a:r>
+          </a:p>
+          <a:p>
+            <a:pPr algn="ctr">
+              <a:defRPr/>
+            </a:pPr>
+            <a:r>
+              <a:rPr lang="en-US" sz="8000" kern="0" dirty="0" smtClean="0">
+                <a:solidFill>
+                  <a:schemeClr val="tx2"/>
+                </a:solidFill>
+                <a:latin typeface="Comic Sans MS" pitchFamily="66" charset="0"/>
+                <a:ea typeface="+mj-ea"/>
+                <a:cs typeface="Comic Sans MS"/>
+              </a:rPr>
+              <a:t>Russell Paradox</a:t>
+            </a:r>
+            <a:r>
+              <a:rPr lang="en-US" sz="8000" kern="0" dirty="0" smtClean="0">
+                <a:solidFill>
+                  <a:schemeClr val="tx2"/>
+                </a:solidFill>
+                <a:latin typeface="Comic Sans MS" pitchFamily="66" charset="0"/>
+                <a:ea typeface="+mj-ea"/>
+                <a:cs typeface="Comic Sans MS"/>
+              </a:rPr>
+              <a:t> </a:t>
+            </a:r>
+            <a:endParaRPr lang="en-US" sz="8000" kern="0" dirty="0" smtClean="0">
+              <a:solidFill>
+                <a:schemeClr val="tx2"/>
+              </a:solidFill>
+              <a:latin typeface="Comic Sans MS" pitchFamily="66" charset="0"/>
+              <a:ea typeface="+mj-ea"/>
+              <a:cs typeface="Comic Sans MS"/>
+            </a:endParaRPr>
           </a:p>
         </p:txBody>
       </p:sp>
@@ -6293,7 +5491,7 @@
                   <a:srgbClr val="0000FF"/>
                 </a:solidFill>
               </a:rPr>
-              <a:t>((define compose f g)</a:t>
+              <a:t>(define (compose f g)</a:t>
             </a:r>
           </a:p>
           <a:p>
@@ -8398,7 +7596,7 @@
           <a:graphicData uri="http://schemas.openxmlformats.org/presentationml/2006/ole">
             <mc:AlternateContent xmlns:mc="http://schemas.openxmlformats.org/markup-compatibility/2006">
               <mc:Choice xmlns:v="urn:schemas-microsoft-com:vml" Requires="v">
-                <p:oleObj spid="_x0000_s58582" name="Equation" r:id="rId5" imgW="1841400" imgH="279360" progId="Equation.DSMT4">
+                <p:oleObj spid="_x0000_s58593" name="Equation" r:id="rId5" imgW="1841400" imgH="279360" progId="Equation.DSMT4">
                   <p:embed/>
                 </p:oleObj>
               </mc:Choice>
@@ -8468,7 +7666,7 @@
           <a:graphicData uri="http://schemas.openxmlformats.org/presentationml/2006/ole">
             <mc:AlternateContent xmlns:mc="http://schemas.openxmlformats.org/markup-compatibility/2006">
               <mc:Choice xmlns:v="urn:schemas-microsoft-com:vml" Requires="v">
-                <p:oleObj spid="_x0000_s58583" name="Equation" r:id="rId7" imgW="1600200" imgH="279360" progId="Equation.DSMT4">
+                <p:oleObj spid="_x0000_s58594" name="Equation" r:id="rId7" imgW="1600200" imgH="279360" progId="Equation.DSMT4">
                   <p:embed/>
                 </p:oleObj>
               </mc:Choice>
@@ -8538,7 +7736,7 @@
           <a:graphicData uri="http://schemas.openxmlformats.org/presentationml/2006/ole">
             <mc:AlternateContent xmlns:mc="http://schemas.openxmlformats.org/markup-compatibility/2006">
               <mc:Choice xmlns:v="urn:schemas-microsoft-com:vml" Requires="v">
-                <p:oleObj spid="_x0000_s58584" name="Equation" r:id="rId9" imgW="1574640" imgH="279360" progId="Equation.DSMT4">
+                <p:oleObj spid="_x0000_s58595" name="Equation" r:id="rId9" imgW="1574640" imgH="279360" progId="Equation.DSMT4">
                   <p:embed/>
                 </p:oleObj>
               </mc:Choice>
@@ -9320,7 +8518,7 @@
           <a:graphicData uri="http://schemas.openxmlformats.org/presentationml/2006/ole">
             <mc:AlternateContent xmlns:mc="http://schemas.openxmlformats.org/markup-compatibility/2006">
               <mc:Choice xmlns:v="urn:schemas-microsoft-com:vml" Requires="v">
-                <p:oleObj spid="_x0000_s59482" name="Equation" r:id="rId5" imgW="1790640" imgH="279360" progId="Equation.DSMT4">
+                <p:oleObj spid="_x0000_s59487" name="Equation" r:id="rId5" imgW="1790640" imgH="279360" progId="Equation.DSMT4">
                   <p:embed/>
                 </p:oleObj>
               </mc:Choice>
@@ -10954,2923 +10152,6 @@
 </p:sld>
 </file>
 
-<file path=ppt/slides/slide20.xml><?xml version="1.0" encoding="utf-8"?>
-<p:sld xmlns:a="http://schemas.openxmlformats.org/drawingml/2006/main" xmlns:r="http://schemas.openxmlformats.org/officeDocument/2006/relationships" xmlns:p="http://schemas.openxmlformats.org/presentationml/2006/main">
-  <p:cSld>
-    <p:spTree>
-      <p:nvGrpSpPr>
-        <p:cNvPr id="1" name=""/>
-        <p:cNvGrpSpPr/>
-        <p:nvPr/>
-      </p:nvGrpSpPr>
-      <p:grpSpPr>
-        <a:xfrm>
-          <a:off x="0" y="0"/>
-          <a:ext cx="0" cy="0"/>
-          <a:chOff x="0" y="0"/>
-          <a:chExt cx="0" cy="0"/>
-        </a:xfrm>
-      </p:grpSpPr>
-      <p:sp>
-        <p:nvSpPr>
-          <p:cNvPr id="2" name="Title 1"/>
-          <p:cNvSpPr>
-            <a:spLocks noGrp="1"/>
-          </p:cNvSpPr>
-          <p:nvPr>
-            <p:ph type="title"/>
-          </p:nvPr>
-        </p:nvSpPr>
-        <p:spPr>
-          <a:xfrm>
-            <a:off x="1445702" y="355345"/>
-            <a:ext cx="7261213" cy="958190"/>
-          </a:xfrm>
-        </p:spPr>
-        <p:txBody>
-          <a:bodyPr/>
-          <a:lstStyle/>
-          <a:p>
-            <a:r>
-              <a:rPr lang="en-US" dirty="0" smtClean="0"/>
-              <a:t>Some Axioms of Set Theory</a:t>
-            </a:r>
-            <a:endParaRPr lang="en-US" dirty="0"/>
-          </a:p>
-        </p:txBody>
-      </p:sp>
-      <p:sp>
-        <p:nvSpPr>
-          <p:cNvPr id="7" name="TextBox 6"/>
-          <p:cNvSpPr txBox="1"/>
-          <p:nvPr/>
-        </p:nvSpPr>
-        <p:spPr>
-          <a:xfrm>
-            <a:off x="365922" y="1528186"/>
-            <a:ext cx="3249608" cy="646331"/>
-          </a:xfrm>
-          <a:prstGeom prst="rect">
-            <a:avLst/>
-          </a:prstGeom>
-          <a:noFill/>
-        </p:spPr>
-        <p:txBody>
-          <a:bodyPr wrap="none" rtlCol="0">
-            <a:spAutoFit/>
-          </a:bodyPr>
-          <a:lstStyle/>
-          <a:p>
-            <a:r>
-              <a:rPr lang="en-US" sz="3600" dirty="0" smtClean="0">
-                <a:solidFill>
-                  <a:srgbClr val="9933FF"/>
-                </a:solidFill>
-                <a:latin typeface="Comic Sans MS"/>
-                <a:cs typeface="Comic Sans MS"/>
-              </a:rPr>
-              <a:t>Extensionality</a:t>
-            </a:r>
-            <a:endParaRPr lang="en-US" sz="3600" dirty="0" smtClean="0">
-              <a:solidFill>
-                <a:srgbClr val="9933FF"/>
-              </a:solidFill>
-              <a:latin typeface="Comic Sans MS"/>
-              <a:cs typeface="Comic Sans MS"/>
-            </a:endParaRPr>
-          </a:p>
-        </p:txBody>
-      </p:sp>
-      <p:sp>
-        <p:nvSpPr>
-          <p:cNvPr id="3" name="TextBox 2"/>
-          <p:cNvSpPr txBox="1"/>
-          <p:nvPr/>
-        </p:nvSpPr>
-        <p:spPr>
-          <a:xfrm>
-            <a:off x="319776" y="2206955"/>
-            <a:ext cx="8473461" cy="769441"/>
-          </a:xfrm>
-          <a:prstGeom prst="rect">
-            <a:avLst/>
-          </a:prstGeom>
-          <a:noFill/>
-        </p:spPr>
-        <p:txBody>
-          <a:bodyPr wrap="square" rtlCol="0">
-            <a:spAutoFit/>
-          </a:bodyPr>
-          <a:lstStyle/>
-          <a:p>
-            <a:r>
-              <a:rPr lang="en-US" sz="4400" dirty="0" smtClean="0">
-                <a:solidFill>
-                  <a:srgbClr val="0000FF"/>
-                </a:solidFill>
-                <a:latin typeface="Comic Sans MS"/>
-                <a:cs typeface="Comic Sans MS"/>
-              </a:rPr>
-              <a:t>x</a:t>
-            </a:r>
-            <a:r>
-              <a:rPr lang="en-US" sz="4400" dirty="0" smtClean="0">
-                <a:latin typeface="Comic Sans MS"/>
-                <a:cs typeface="Comic Sans MS"/>
-              </a:rPr>
-              <a:t> and</a:t>
-            </a:r>
-            <a:r>
-              <a:rPr lang="en-US" sz="4400" dirty="0" smtClean="0">
-                <a:solidFill>
-                  <a:srgbClr val="0000FF"/>
-                </a:solidFill>
-                <a:latin typeface="Comic Sans MS"/>
-                <a:cs typeface="Comic Sans MS"/>
-              </a:rPr>
-              <a:t> y</a:t>
-            </a:r>
-            <a:r>
-              <a:rPr lang="en-US" sz="4400" dirty="0" smtClean="0">
-                <a:latin typeface="Comic Sans MS"/>
-                <a:cs typeface="Comic Sans MS"/>
-              </a:rPr>
-              <a:t> have the same elements</a:t>
-            </a:r>
-            <a:endParaRPr lang="en-US" sz="4400" dirty="0">
-              <a:latin typeface="Comic Sans MS"/>
-              <a:cs typeface="Comic Sans MS"/>
-            </a:endParaRPr>
-          </a:p>
-        </p:txBody>
-      </p:sp>
-    </p:spTree>
-    <p:custDataLst>
-      <p:tags r:id="rId1"/>
-    </p:custDataLst>
-    <p:extLst>
-      <p:ext uri="{BB962C8B-B14F-4D97-AF65-F5344CB8AC3E}">
-        <p14:creationId xmlns:p14="http://schemas.microsoft.com/office/powerpoint/2010/main" val="3944227324"/>
-      </p:ext>
-    </p:extLst>
-  </p:cSld>
-  <p:clrMapOvr>
-    <a:masterClrMapping/>
-  </p:clrMapOvr>
-  <p:transition xmlns:p14="http://schemas.microsoft.com/office/powerpoint/2010/main" spd="slow" advClick="0">
-    <p:fade thruBlk="1"/>
-  </p:transition>
-  <p:timing>
-    <p:tnLst>
-      <p:par>
-        <p:cTn xmlns:p14="http://schemas.microsoft.com/office/powerpoint/2010/main" id="1" dur="indefinite" restart="never" nodeType="tmRoot">
-          <p:childTnLst>
-            <p:seq concurrent="1" nextAc="seek">
-              <p:cTn id="2" dur="indefinite" nodeType="mainSeq">
-                <p:childTnLst>
-                  <p:par>
-                    <p:cTn id="3" fill="hold">
-                      <p:stCondLst>
-                        <p:cond delay="indefinite"/>
-                      </p:stCondLst>
-                      <p:childTnLst>
-                        <p:par>
-                          <p:cTn id="4" fill="hold">
-                            <p:stCondLst>
-                              <p:cond delay="0"/>
-                            </p:stCondLst>
-                            <p:childTnLst>
-                              <p:par>
-                                <p:cTn id="5" presetID="9" presetClass="entr" presetSubtype="0" fill="hold" grpId="0" nodeType="clickEffect">
-                                  <p:stCondLst>
-                                    <p:cond delay="0"/>
-                                  </p:stCondLst>
-                                  <p:childTnLst>
-                                    <p:set>
-                                      <p:cBhvr>
-                                        <p:cTn id="6" dur="1" fill="hold">
-                                          <p:stCondLst>
-                                            <p:cond delay="0"/>
-                                          </p:stCondLst>
-                                        </p:cTn>
-                                        <p:tgtEl>
-                                          <p:spTgt spid="7"/>
-                                        </p:tgtEl>
-                                        <p:attrNameLst>
-                                          <p:attrName>style.visibility</p:attrName>
-                                        </p:attrNameLst>
-                                      </p:cBhvr>
-                                      <p:to>
-                                        <p:strVal val="visible"/>
-                                      </p:to>
-                                    </p:set>
-                                    <p:animEffect transition="in" filter="dissolve">
-                                      <p:cBhvr>
-                                        <p:cTn id="7" dur="500"/>
-                                        <p:tgtEl>
-                                          <p:spTgt spid="7"/>
-                                        </p:tgtEl>
-                                      </p:cBhvr>
-                                    </p:animEffect>
-                                  </p:childTnLst>
-                                </p:cTn>
-                              </p:par>
-                            </p:childTnLst>
-                          </p:cTn>
-                        </p:par>
-                      </p:childTnLst>
-                    </p:cTn>
-                  </p:par>
-                  <p:par>
-                    <p:cTn id="8" fill="hold">
-                      <p:stCondLst>
-                        <p:cond delay="indefinite"/>
-                      </p:stCondLst>
-                      <p:childTnLst>
-                        <p:par>
-                          <p:cTn id="9" fill="hold">
-                            <p:stCondLst>
-                              <p:cond delay="0"/>
-                            </p:stCondLst>
-                            <p:childTnLst>
-                              <p:par>
-                                <p:cTn id="10" presetID="10" presetClass="entr" presetSubtype="0" fill="hold" grpId="0" nodeType="clickEffect">
-                                  <p:stCondLst>
-                                    <p:cond delay="0"/>
-                                  </p:stCondLst>
-                                  <p:childTnLst>
-                                    <p:set>
-                                      <p:cBhvr>
-                                        <p:cTn id="11" dur="1" fill="hold">
-                                          <p:stCondLst>
-                                            <p:cond delay="0"/>
-                                          </p:stCondLst>
-                                        </p:cTn>
-                                        <p:tgtEl>
-                                          <p:spTgt spid="3">
-                                            <p:txEl>
-                                              <p:pRg st="0" end="0"/>
-                                            </p:txEl>
-                                          </p:spTgt>
-                                        </p:tgtEl>
-                                        <p:attrNameLst>
-                                          <p:attrName>style.visibility</p:attrName>
-                                        </p:attrNameLst>
-                                      </p:cBhvr>
-                                      <p:to>
-                                        <p:strVal val="visible"/>
-                                      </p:to>
-                                    </p:set>
-                                    <p:animEffect transition="in" filter="fade">
-                                      <p:cBhvr>
-                                        <p:cTn id="12" dur="500"/>
-                                        <p:tgtEl>
-                                          <p:spTgt spid="3">
-                                            <p:txEl>
-                                              <p:pRg st="0" end="0"/>
-                                            </p:txEl>
-                                          </p:spTgt>
-                                        </p:tgtEl>
-                                      </p:cBhvr>
-                                    </p:animEffect>
-                                  </p:childTnLst>
-                                </p:cTn>
-                              </p:par>
-                            </p:childTnLst>
-                          </p:cTn>
-                        </p:par>
-                      </p:childTnLst>
-                    </p:cTn>
-                  </p:par>
-                </p:childTnLst>
-              </p:cTn>
-              <p:prevCondLst>
-                <p:cond evt="onPrev" delay="0">
-                  <p:tgtEl>
-                    <p:sldTgt/>
-                  </p:tgtEl>
-                </p:cond>
-              </p:prevCondLst>
-              <p:nextCondLst>
-                <p:cond evt="onNext" delay="0">
-                  <p:tgtEl>
-                    <p:sldTgt/>
-                  </p:tgtEl>
-                </p:cond>
-              </p:nextCondLst>
-            </p:seq>
-          </p:childTnLst>
-        </p:cTn>
-      </p:par>
-    </p:tnLst>
-    <p:bldLst>
-      <p:bldP spid="7" grpId="0"/>
-      <p:bldP spid="3" grpId="0" build="p"/>
-    </p:bldLst>
-  </p:timing>
-</p:sld>
-</file>
-
-<file path=ppt/slides/slide21.xml><?xml version="1.0" encoding="utf-8"?>
-<p:sld xmlns:a="http://schemas.openxmlformats.org/drawingml/2006/main" xmlns:r="http://schemas.openxmlformats.org/officeDocument/2006/relationships" xmlns:p="http://schemas.openxmlformats.org/presentationml/2006/main">
-  <p:cSld>
-    <p:spTree>
-      <p:nvGrpSpPr>
-        <p:cNvPr id="1" name=""/>
-        <p:cNvGrpSpPr/>
-        <p:nvPr/>
-      </p:nvGrpSpPr>
-      <p:grpSpPr>
-        <a:xfrm>
-          <a:off x="0" y="0"/>
-          <a:ext cx="0" cy="0"/>
-          <a:chOff x="0" y="0"/>
-          <a:chExt cx="0" cy="0"/>
-        </a:xfrm>
-      </p:grpSpPr>
-      <p:sp>
-        <p:nvSpPr>
-          <p:cNvPr id="2" name="Title 1"/>
-          <p:cNvSpPr>
-            <a:spLocks noGrp="1"/>
-          </p:cNvSpPr>
-          <p:nvPr>
-            <p:ph type="title"/>
-          </p:nvPr>
-        </p:nvSpPr>
-        <p:spPr>
-          <a:xfrm>
-            <a:off x="1445702" y="355345"/>
-            <a:ext cx="7261213" cy="958190"/>
-          </a:xfrm>
-        </p:spPr>
-        <p:txBody>
-          <a:bodyPr/>
-          <a:lstStyle/>
-          <a:p>
-            <a:r>
-              <a:rPr lang="en-US" dirty="0" smtClean="0"/>
-              <a:t>Some Axioms of Set Theory</a:t>
-            </a:r>
-            <a:endParaRPr lang="en-US" dirty="0"/>
-          </a:p>
-        </p:txBody>
-      </p:sp>
-      <p:graphicFrame>
-        <p:nvGraphicFramePr>
-          <p:cNvPr id="6" name="Object 5"/>
-          <p:cNvGraphicFramePr>
-            <a:graphicFrameLocks noChangeAspect="1"/>
-          </p:cNvGraphicFramePr>
-          <p:nvPr>
-            <p:extLst>
-              <p:ext uri="{D42A27DB-BD31-4B8C-83A1-F6EECF244321}">
-                <p14:modId xmlns:p14="http://schemas.microsoft.com/office/powerpoint/2010/main" val="1380770512"/>
-              </p:ext>
-            </p:extLst>
-          </p:nvPr>
-        </p:nvGraphicFramePr>
-        <p:xfrm>
-          <a:off x="1128608" y="2316163"/>
-          <a:ext cx="5207000" cy="860425"/>
-        </p:xfrm>
-        <a:graphic>
-          <a:graphicData uri="http://schemas.openxmlformats.org/presentationml/2006/ole">
-            <mc:AlternateContent xmlns:mc="http://schemas.openxmlformats.org/markup-compatibility/2006">
-              <mc:Choice xmlns:v="urn:schemas-microsoft-com:vml" Requires="v">
-                <p:oleObj spid="_x0000_s61450" name="Equation" r:id="rId5" imgW="1308100" imgH="215900" progId="Equation.DSMT4">
-                  <p:embed/>
-                </p:oleObj>
-              </mc:Choice>
-              <mc:Fallback>
-                <p:oleObj name="Equation" r:id="rId5" imgW="1308100" imgH="215900" progId="Equation.DSMT4">
-                  <p:embed/>
-                  <p:pic>
-                    <p:nvPicPr>
-                      <p:cNvPr id="0" name=""/>
-                      <p:cNvPicPr>
-                        <a:picLocks noChangeAspect="1" noChangeArrowheads="1"/>
-                      </p:cNvPicPr>
-                      <p:nvPr/>
-                    </p:nvPicPr>
-                    <p:blipFill>
-                      <a:blip r:embed="rId6"/>
-                      <a:srcRect/>
-                      <a:stretch>
-                        <a:fillRect/>
-                      </a:stretch>
-                    </p:blipFill>
-                    <p:spPr bwMode="auto">
-                      <a:xfrm>
-                        <a:off x="1128608" y="2316163"/>
-                        <a:ext cx="5207000" cy="860425"/>
-                      </a:xfrm>
-                      <a:prstGeom prst="rect">
-                        <a:avLst/>
-                      </a:prstGeom>
-                      <a:noFill/>
-                    </p:spPr>
-                  </p:pic>
-                </p:oleObj>
-              </mc:Fallback>
-            </mc:AlternateContent>
-          </a:graphicData>
-        </a:graphic>
-      </p:graphicFrame>
-      <p:sp>
-        <p:nvSpPr>
-          <p:cNvPr id="7" name="TextBox 6"/>
-          <p:cNvSpPr txBox="1"/>
-          <p:nvPr/>
-        </p:nvSpPr>
-        <p:spPr>
-          <a:xfrm>
-            <a:off x="365922" y="1528186"/>
-            <a:ext cx="3249608" cy="646331"/>
-          </a:xfrm>
-          <a:prstGeom prst="rect">
-            <a:avLst/>
-          </a:prstGeom>
-          <a:noFill/>
-        </p:spPr>
-        <p:txBody>
-          <a:bodyPr wrap="none" rtlCol="0">
-            <a:spAutoFit/>
-          </a:bodyPr>
-          <a:lstStyle/>
-          <a:p>
-            <a:r>
-              <a:rPr lang="en-US" sz="3600" dirty="0" smtClean="0">
-                <a:solidFill>
-                  <a:srgbClr val="9933FF"/>
-                </a:solidFill>
-                <a:latin typeface="Comic Sans MS"/>
-                <a:cs typeface="Comic Sans MS"/>
-              </a:rPr>
-              <a:t>Extensionality</a:t>
-            </a:r>
-            <a:endParaRPr lang="en-US" sz="3600" dirty="0" smtClean="0">
-              <a:solidFill>
-                <a:srgbClr val="9933FF"/>
-              </a:solidFill>
-              <a:latin typeface="Comic Sans MS"/>
-              <a:cs typeface="Comic Sans MS"/>
-            </a:endParaRPr>
-          </a:p>
-        </p:txBody>
-      </p:sp>
-      <p:sp>
-        <p:nvSpPr>
-          <p:cNvPr id="8" name="TextBox 7"/>
-          <p:cNvSpPr txBox="1"/>
-          <p:nvPr/>
-        </p:nvSpPr>
-        <p:spPr>
-          <a:xfrm>
-            <a:off x="319776" y="2325655"/>
-            <a:ext cx="8473461" cy="2873046"/>
-          </a:xfrm>
-          <a:prstGeom prst="rect">
-            <a:avLst/>
-          </a:prstGeom>
-          <a:noFill/>
-        </p:spPr>
-        <p:txBody>
-          <a:bodyPr wrap="square" rtlCol="0">
-            <a:spAutoFit/>
-          </a:bodyPr>
-          <a:lstStyle/>
-          <a:p>
-            <a:endParaRPr lang="en-US" sz="4400" dirty="0" smtClean="0">
-              <a:solidFill>
-                <a:srgbClr val="0000FF"/>
-              </a:solidFill>
-              <a:latin typeface="Comic Sans MS"/>
-              <a:cs typeface="Comic Sans MS"/>
-            </a:endParaRPr>
-          </a:p>
-          <a:p>
-            <a:r>
-              <a:rPr lang="en-US" sz="4400" dirty="0" err="1" smtClean="0">
-                <a:latin typeface="Comic Sans MS"/>
-                <a:cs typeface="Comic Sans MS"/>
-              </a:rPr>
-              <a:t>iff</a:t>
-            </a:r>
-            <a:endParaRPr lang="en-US" sz="4400" dirty="0">
-              <a:latin typeface="Comic Sans MS"/>
-              <a:cs typeface="Comic Sans MS"/>
-            </a:endParaRPr>
-          </a:p>
-          <a:p>
-            <a:r>
-              <a:rPr lang="en-US" sz="4400" dirty="0">
-                <a:solidFill>
-                  <a:srgbClr val="0000FF"/>
-                </a:solidFill>
-                <a:latin typeface="Comic Sans MS"/>
-                <a:cs typeface="Comic Sans MS"/>
-              </a:rPr>
-              <a:t>x</a:t>
-            </a:r>
-            <a:r>
-              <a:rPr lang="en-US" sz="4400" dirty="0">
-                <a:latin typeface="Comic Sans MS"/>
-                <a:cs typeface="Comic Sans MS"/>
-              </a:rPr>
-              <a:t> and</a:t>
-            </a:r>
-            <a:r>
-              <a:rPr lang="en-US" sz="4400" dirty="0">
-                <a:solidFill>
-                  <a:srgbClr val="0000FF"/>
-                </a:solidFill>
-                <a:latin typeface="Comic Sans MS"/>
-                <a:cs typeface="Comic Sans MS"/>
-              </a:rPr>
-              <a:t> y</a:t>
-            </a:r>
-            <a:r>
-              <a:rPr lang="en-US" sz="4400" dirty="0">
-                <a:latin typeface="Comic Sans MS"/>
-                <a:cs typeface="Comic Sans MS"/>
-              </a:rPr>
-              <a:t> </a:t>
-            </a:r>
-            <a:r>
-              <a:rPr lang="en-US" sz="4400" dirty="0" smtClean="0">
-                <a:latin typeface="Comic Sans MS"/>
-                <a:cs typeface="Comic Sans MS"/>
-              </a:rPr>
-              <a:t>are members of the</a:t>
-            </a:r>
-          </a:p>
-          <a:p>
-            <a:r>
-              <a:rPr lang="en-US" sz="4400" dirty="0" smtClean="0">
-                <a:latin typeface="Comic Sans MS"/>
-                <a:cs typeface="Comic Sans MS"/>
-              </a:rPr>
-              <a:t>same sets</a:t>
-            </a:r>
-            <a:endParaRPr lang="en-US" sz="4400" dirty="0" smtClean="0">
-              <a:latin typeface="Comic Sans MS"/>
-              <a:cs typeface="Comic Sans MS"/>
-            </a:endParaRPr>
-          </a:p>
-        </p:txBody>
-      </p:sp>
-    </p:spTree>
-    <p:custDataLst>
-      <p:tags r:id="rId2"/>
-    </p:custDataLst>
-    <p:extLst>
-      <p:ext uri="{BB962C8B-B14F-4D97-AF65-F5344CB8AC3E}">
-        <p14:creationId xmlns:p14="http://schemas.microsoft.com/office/powerpoint/2010/main" val="2974375148"/>
-      </p:ext>
-    </p:extLst>
-  </p:cSld>
-  <p:clrMapOvr>
-    <a:masterClrMapping/>
-  </p:clrMapOvr>
-  <mc:AlternateContent xmlns:mc="http://schemas.openxmlformats.org/markup-compatibility/2006">
-    <mc:Choice xmlns:p14="http://schemas.microsoft.com/office/powerpoint/2010/main" Requires="p14">
-      <p:transition spd="med" p14:dur="700" advClick="0">
-        <p:fade/>
-      </p:transition>
-    </mc:Choice>
-    <mc:Fallback>
-      <p:transition xmlns:p14="http://schemas.microsoft.com/office/powerpoint/2010/main" spd="med" advClick="0">
-        <p:fade/>
-      </p:transition>
-    </mc:Fallback>
-  </mc:AlternateContent>
-  <p:timing>
-    <p:tnLst>
-      <p:par>
-        <p:cTn xmlns:p14="http://schemas.microsoft.com/office/powerpoint/2010/main" id="1" dur="indefinite" restart="never" nodeType="tmRoot">
-          <p:childTnLst>
-            <p:seq concurrent="1" nextAc="seek">
-              <p:cTn id="2" dur="indefinite" nodeType="mainSeq">
-                <p:childTnLst>
-                  <p:par>
-                    <p:cTn id="3" fill="hold">
-                      <p:stCondLst>
-                        <p:cond delay="indefinite"/>
-                      </p:stCondLst>
-                      <p:childTnLst>
-                        <p:par>
-                          <p:cTn id="4" fill="hold">
-                            <p:stCondLst>
-                              <p:cond delay="0"/>
-                            </p:stCondLst>
-                            <p:childTnLst>
-                              <p:par>
-                                <p:cTn id="5" presetID="10" presetClass="entr" presetSubtype="0" fill="hold" nodeType="clickEffect">
-                                  <p:stCondLst>
-                                    <p:cond delay="0"/>
-                                  </p:stCondLst>
-                                  <p:childTnLst>
-                                    <p:set>
-                                      <p:cBhvr>
-                                        <p:cTn id="6" dur="1" fill="hold">
-                                          <p:stCondLst>
-                                            <p:cond delay="0"/>
-                                          </p:stCondLst>
-                                        </p:cTn>
-                                        <p:tgtEl>
-                                          <p:spTgt spid="8">
-                                            <p:txEl>
-                                              <p:pRg st="1" end="1"/>
-                                            </p:txEl>
-                                          </p:spTgt>
-                                        </p:tgtEl>
-                                        <p:attrNameLst>
-                                          <p:attrName>style.visibility</p:attrName>
-                                        </p:attrNameLst>
-                                      </p:cBhvr>
-                                      <p:to>
-                                        <p:strVal val="visible"/>
-                                      </p:to>
-                                    </p:set>
-                                    <p:animEffect transition="in" filter="fade">
-                                      <p:cBhvr>
-                                        <p:cTn id="7" dur="500"/>
-                                        <p:tgtEl>
-                                          <p:spTgt spid="8">
-                                            <p:txEl>
-                                              <p:pRg st="1" end="1"/>
-                                            </p:txEl>
-                                          </p:spTgt>
-                                        </p:tgtEl>
-                                      </p:cBhvr>
-                                    </p:animEffect>
-                                  </p:childTnLst>
-                                </p:cTn>
-                              </p:par>
-                            </p:childTnLst>
-                          </p:cTn>
-                        </p:par>
-                      </p:childTnLst>
-                    </p:cTn>
-                  </p:par>
-                  <p:par>
-                    <p:cTn id="8" fill="hold">
-                      <p:stCondLst>
-                        <p:cond delay="indefinite"/>
-                      </p:stCondLst>
-                      <p:childTnLst>
-                        <p:par>
-                          <p:cTn id="9" fill="hold">
-                            <p:stCondLst>
-                              <p:cond delay="0"/>
-                            </p:stCondLst>
-                            <p:childTnLst>
-                              <p:par>
-                                <p:cTn id="10" presetID="10" presetClass="entr" presetSubtype="0" fill="hold" grpId="0" nodeType="clickEffect">
-                                  <p:stCondLst>
-                                    <p:cond delay="0"/>
-                                  </p:stCondLst>
-                                  <p:childTnLst>
-                                    <p:set>
-                                      <p:cBhvr>
-                                        <p:cTn id="11" dur="1" fill="hold">
-                                          <p:stCondLst>
-                                            <p:cond delay="0"/>
-                                          </p:stCondLst>
-                                        </p:cTn>
-                                        <p:tgtEl>
-                                          <p:spTgt spid="8">
-                                            <p:txEl>
-                                              <p:pRg st="2" end="2"/>
-                                            </p:txEl>
-                                          </p:spTgt>
-                                        </p:tgtEl>
-                                        <p:attrNameLst>
-                                          <p:attrName>style.visibility</p:attrName>
-                                        </p:attrNameLst>
-                                      </p:cBhvr>
-                                      <p:to>
-                                        <p:strVal val="visible"/>
-                                      </p:to>
-                                    </p:set>
-                                    <p:animEffect transition="in" filter="fade">
-                                      <p:cBhvr>
-                                        <p:cTn id="12" dur="500"/>
-                                        <p:tgtEl>
-                                          <p:spTgt spid="8">
-                                            <p:txEl>
-                                              <p:pRg st="2" end="2"/>
-                                            </p:txEl>
-                                          </p:spTgt>
-                                        </p:tgtEl>
-                                      </p:cBhvr>
-                                    </p:animEffect>
-                                  </p:childTnLst>
-                                </p:cTn>
-                              </p:par>
-                              <p:par>
-                                <p:cTn id="13" presetID="10" presetClass="entr" presetSubtype="0" fill="hold" grpId="0" nodeType="withEffect">
-                                  <p:stCondLst>
-                                    <p:cond delay="0"/>
-                                  </p:stCondLst>
-                                  <p:childTnLst>
-                                    <p:set>
-                                      <p:cBhvr>
-                                        <p:cTn id="14" dur="1" fill="hold">
-                                          <p:stCondLst>
-                                            <p:cond delay="0"/>
-                                          </p:stCondLst>
-                                        </p:cTn>
-                                        <p:tgtEl>
-                                          <p:spTgt spid="8">
-                                            <p:txEl>
-                                              <p:pRg st="3" end="3"/>
-                                            </p:txEl>
-                                          </p:spTgt>
-                                        </p:tgtEl>
-                                        <p:attrNameLst>
-                                          <p:attrName>style.visibility</p:attrName>
-                                        </p:attrNameLst>
-                                      </p:cBhvr>
-                                      <p:to>
-                                        <p:strVal val="visible"/>
-                                      </p:to>
-                                    </p:set>
-                                    <p:animEffect transition="in" filter="fade">
-                                      <p:cBhvr>
-                                        <p:cTn id="15" dur="500"/>
-                                        <p:tgtEl>
-                                          <p:spTgt spid="8">
-                                            <p:txEl>
-                                              <p:pRg st="3" end="3"/>
-                                            </p:txEl>
-                                          </p:spTgt>
-                                        </p:tgtEl>
-                                      </p:cBhvr>
-                                    </p:animEffect>
-                                  </p:childTnLst>
-                                </p:cTn>
-                              </p:par>
-                            </p:childTnLst>
-                          </p:cTn>
-                        </p:par>
-                      </p:childTnLst>
-                    </p:cTn>
-                  </p:par>
-                </p:childTnLst>
-              </p:cTn>
-              <p:prevCondLst>
-                <p:cond evt="onPrev" delay="0">
-                  <p:tgtEl>
-                    <p:sldTgt/>
-                  </p:tgtEl>
-                </p:cond>
-              </p:prevCondLst>
-              <p:nextCondLst>
-                <p:cond evt="onNext" delay="0">
-                  <p:tgtEl>
-                    <p:sldTgt/>
-                  </p:tgtEl>
-                </p:cond>
-              </p:nextCondLst>
-            </p:seq>
-          </p:childTnLst>
-        </p:cTn>
-      </p:par>
-    </p:tnLst>
-    <p:bldLst>
-      <p:bldP spid="8" grpId="0" build="p"/>
-    </p:bldLst>
-  </p:timing>
-</p:sld>
-</file>
-
-<file path=ppt/slides/slide22.xml><?xml version="1.0" encoding="utf-8"?>
-<p:sld xmlns:a="http://schemas.openxmlformats.org/drawingml/2006/main" xmlns:r="http://schemas.openxmlformats.org/officeDocument/2006/relationships" xmlns:p="http://schemas.openxmlformats.org/presentationml/2006/main">
-  <p:cSld>
-    <p:spTree>
-      <p:nvGrpSpPr>
-        <p:cNvPr id="1" name=""/>
-        <p:cNvGrpSpPr/>
-        <p:nvPr/>
-      </p:nvGrpSpPr>
-      <p:grpSpPr>
-        <a:xfrm>
-          <a:off x="0" y="0"/>
-          <a:ext cx="0" cy="0"/>
-          <a:chOff x="0" y="0"/>
-          <a:chExt cx="0" cy="0"/>
-        </a:xfrm>
-      </p:grpSpPr>
-      <p:sp>
-        <p:nvSpPr>
-          <p:cNvPr id="2" name="Title 1"/>
-          <p:cNvSpPr>
-            <a:spLocks noGrp="1"/>
-          </p:cNvSpPr>
-          <p:nvPr>
-            <p:ph type="title"/>
-          </p:nvPr>
-        </p:nvSpPr>
-        <p:spPr>
-          <a:xfrm>
-            <a:off x="1445702" y="355345"/>
-            <a:ext cx="7261213" cy="958190"/>
-          </a:xfrm>
-        </p:spPr>
-        <p:txBody>
-          <a:bodyPr/>
-          <a:lstStyle/>
-          <a:p>
-            <a:r>
-              <a:rPr lang="en-US" dirty="0" smtClean="0"/>
-              <a:t>Some Axioms of Set Theory</a:t>
-            </a:r>
-            <a:endParaRPr lang="en-US" dirty="0"/>
-          </a:p>
-        </p:txBody>
-      </p:sp>
-      <p:graphicFrame>
-        <p:nvGraphicFramePr>
-          <p:cNvPr id="6" name="Object 5"/>
-          <p:cNvGraphicFramePr>
-            <a:graphicFrameLocks noChangeAspect="1"/>
-          </p:cNvGraphicFramePr>
-          <p:nvPr>
-            <p:extLst>
-              <p:ext uri="{D42A27DB-BD31-4B8C-83A1-F6EECF244321}">
-                <p14:modId xmlns:p14="http://schemas.microsoft.com/office/powerpoint/2010/main" val="239289226"/>
-              </p:ext>
-            </p:extLst>
-          </p:nvPr>
-        </p:nvGraphicFramePr>
-        <p:xfrm>
-          <a:off x="1128608" y="2316163"/>
-          <a:ext cx="5207000" cy="860425"/>
-        </p:xfrm>
-        <a:graphic>
-          <a:graphicData uri="http://schemas.openxmlformats.org/presentationml/2006/ole">
-            <mc:AlternateContent xmlns:mc="http://schemas.openxmlformats.org/markup-compatibility/2006">
-              <mc:Choice xmlns:v="urn:schemas-microsoft-com:vml" Requires="v">
-                <p:oleObj spid="_x0000_s64523" name="Equation" r:id="rId5" imgW="1308100" imgH="215900" progId="Equation.DSMT4">
-                  <p:embed/>
-                </p:oleObj>
-              </mc:Choice>
-              <mc:Fallback>
-                <p:oleObj name="Equation" r:id="rId5" imgW="1308100" imgH="215900" progId="Equation.DSMT4">
-                  <p:embed/>
-                  <p:pic>
-                    <p:nvPicPr>
-                      <p:cNvPr id="0" name=""/>
-                      <p:cNvPicPr>
-                        <a:picLocks noChangeAspect="1" noChangeArrowheads="1"/>
-                      </p:cNvPicPr>
-                      <p:nvPr/>
-                    </p:nvPicPr>
-                    <p:blipFill>
-                      <a:blip r:embed="rId6"/>
-                      <a:srcRect/>
-                      <a:stretch>
-                        <a:fillRect/>
-                      </a:stretch>
-                    </p:blipFill>
-                    <p:spPr bwMode="auto">
-                      <a:xfrm>
-                        <a:off x="1128608" y="2316163"/>
-                        <a:ext cx="5207000" cy="860425"/>
-                      </a:xfrm>
-                      <a:prstGeom prst="rect">
-                        <a:avLst/>
-                      </a:prstGeom>
-                      <a:noFill/>
-                    </p:spPr>
-                  </p:pic>
-                </p:oleObj>
-              </mc:Fallback>
-            </mc:AlternateContent>
-          </a:graphicData>
-        </a:graphic>
-      </p:graphicFrame>
-      <p:sp>
-        <p:nvSpPr>
-          <p:cNvPr id="7" name="TextBox 6"/>
-          <p:cNvSpPr txBox="1"/>
-          <p:nvPr/>
-        </p:nvSpPr>
-        <p:spPr>
-          <a:xfrm>
-            <a:off x="365922" y="1528186"/>
-            <a:ext cx="3249608" cy="646331"/>
-          </a:xfrm>
-          <a:prstGeom prst="rect">
-            <a:avLst/>
-          </a:prstGeom>
-          <a:noFill/>
-        </p:spPr>
-        <p:txBody>
-          <a:bodyPr wrap="none" rtlCol="0">
-            <a:spAutoFit/>
-          </a:bodyPr>
-          <a:lstStyle/>
-          <a:p>
-            <a:r>
-              <a:rPr lang="en-US" sz="3600" dirty="0" smtClean="0">
-                <a:solidFill>
-                  <a:srgbClr val="9933FF"/>
-                </a:solidFill>
-                <a:latin typeface="Comic Sans MS"/>
-                <a:cs typeface="Comic Sans MS"/>
-              </a:rPr>
-              <a:t>Extensionality</a:t>
-            </a:r>
-            <a:endParaRPr lang="en-US" sz="3600" dirty="0" smtClean="0">
-              <a:solidFill>
-                <a:srgbClr val="9933FF"/>
-              </a:solidFill>
-              <a:latin typeface="Comic Sans MS"/>
-              <a:cs typeface="Comic Sans MS"/>
-            </a:endParaRPr>
-          </a:p>
-        </p:txBody>
-      </p:sp>
-      <p:sp>
-        <p:nvSpPr>
-          <p:cNvPr id="8" name="TextBox 7"/>
-          <p:cNvSpPr txBox="1"/>
-          <p:nvPr/>
-        </p:nvSpPr>
-        <p:spPr>
-          <a:xfrm>
-            <a:off x="319776" y="2325655"/>
-            <a:ext cx="8473461" cy="1446550"/>
-          </a:xfrm>
-          <a:prstGeom prst="rect">
-            <a:avLst/>
-          </a:prstGeom>
-          <a:noFill/>
-        </p:spPr>
-        <p:txBody>
-          <a:bodyPr wrap="square" rtlCol="0">
-            <a:spAutoFit/>
-          </a:bodyPr>
-          <a:lstStyle/>
-          <a:p>
-            <a:endParaRPr lang="en-US" sz="4400" dirty="0" smtClean="0">
-              <a:solidFill>
-                <a:srgbClr val="0000FF"/>
-              </a:solidFill>
-              <a:latin typeface="Comic Sans MS"/>
-              <a:cs typeface="Comic Sans MS"/>
-            </a:endParaRPr>
-          </a:p>
-          <a:p>
-            <a:r>
-              <a:rPr lang="en-US" sz="4400" dirty="0" err="1" smtClean="0">
-                <a:latin typeface="Comic Sans MS"/>
-                <a:cs typeface="Comic Sans MS"/>
-              </a:rPr>
-              <a:t>iff</a:t>
-            </a:r>
-            <a:endParaRPr lang="en-US" sz="4400" dirty="0">
-              <a:latin typeface="Comic Sans MS"/>
-              <a:cs typeface="Comic Sans MS"/>
-            </a:endParaRPr>
-          </a:p>
-        </p:txBody>
-      </p:sp>
-      <p:graphicFrame>
-        <p:nvGraphicFramePr>
-          <p:cNvPr id="9" name="Object 8"/>
-          <p:cNvGraphicFramePr>
-            <a:graphicFrameLocks noChangeAspect="1"/>
-          </p:cNvGraphicFramePr>
-          <p:nvPr>
-            <p:extLst>
-              <p:ext uri="{D42A27DB-BD31-4B8C-83A1-F6EECF244321}">
-                <p14:modId xmlns:p14="http://schemas.microsoft.com/office/powerpoint/2010/main" val="885801696"/>
-              </p:ext>
-            </p:extLst>
-          </p:nvPr>
-        </p:nvGraphicFramePr>
-        <p:xfrm>
-          <a:off x="1091188" y="3963048"/>
-          <a:ext cx="5208588" cy="860425"/>
-        </p:xfrm>
-        <a:graphic>
-          <a:graphicData uri="http://schemas.openxmlformats.org/presentationml/2006/ole">
-            <mc:AlternateContent xmlns:mc="http://schemas.openxmlformats.org/markup-compatibility/2006">
-              <mc:Choice xmlns:v="urn:schemas-microsoft-com:vml" Requires="v">
-                <p:oleObj spid="_x0000_s64524" name="Equation" r:id="rId7" imgW="1308100" imgH="215900" progId="Equation.DSMT4">
-                  <p:embed/>
-                </p:oleObj>
-              </mc:Choice>
-              <mc:Fallback>
-                <p:oleObj name="Equation" r:id="rId7" imgW="1308100" imgH="215900" progId="Equation.DSMT4">
-                  <p:embed/>
-                  <p:pic>
-                    <p:nvPicPr>
-                      <p:cNvPr id="0" name=""/>
-                      <p:cNvPicPr>
-                        <a:picLocks noChangeAspect="1" noChangeArrowheads="1"/>
-                      </p:cNvPicPr>
-                      <p:nvPr/>
-                    </p:nvPicPr>
-                    <p:blipFill>
-                      <a:blip r:embed="rId8"/>
-                      <a:srcRect/>
-                      <a:stretch>
-                        <a:fillRect/>
-                      </a:stretch>
-                    </p:blipFill>
-                    <p:spPr bwMode="auto">
-                      <a:xfrm>
-                        <a:off x="1091188" y="3963048"/>
-                        <a:ext cx="5208588" cy="860425"/>
-                      </a:xfrm>
-                      <a:prstGeom prst="rect">
-                        <a:avLst/>
-                      </a:prstGeom>
-                      <a:noFill/>
-                    </p:spPr>
-                  </p:pic>
-                </p:oleObj>
-              </mc:Fallback>
-            </mc:AlternateContent>
-          </a:graphicData>
-        </a:graphic>
-      </p:graphicFrame>
-    </p:spTree>
-    <p:custDataLst>
-      <p:tags r:id="rId2"/>
-    </p:custDataLst>
-    <p:extLst>
-      <p:ext uri="{BB962C8B-B14F-4D97-AF65-F5344CB8AC3E}">
-        <p14:creationId xmlns:p14="http://schemas.microsoft.com/office/powerpoint/2010/main" val="983655826"/>
-      </p:ext>
-    </p:extLst>
-  </p:cSld>
-  <p:clrMapOvr>
-    <a:masterClrMapping/>
-  </p:clrMapOvr>
-  <mc:AlternateContent xmlns:mc="http://schemas.openxmlformats.org/markup-compatibility/2006">
-    <mc:Choice xmlns:p14="http://schemas.microsoft.com/office/powerpoint/2010/main" Requires="p14">
-      <p:transition spd="slow" p14:dur="800" advClick="0">
-        <p:fade/>
-      </p:transition>
-    </mc:Choice>
-    <mc:Fallback>
-      <p:transition xmlns:p14="http://schemas.microsoft.com/office/powerpoint/2010/main" spd="slow" advClick="0">
-        <p:fade/>
-      </p:transition>
-    </mc:Fallback>
-  </mc:AlternateContent>
-  <p:timing>
-    <p:tnLst>
-      <p:par>
-        <p:cTn xmlns:p14="http://schemas.microsoft.com/office/powerpoint/2010/main" id="1" dur="indefinite" restart="never" nodeType="tmRoot"/>
-      </p:par>
-    </p:tnLst>
-  </p:timing>
-</p:sld>
-</file>
-
-<file path=ppt/slides/slide23.xml><?xml version="1.0" encoding="utf-8"?>
-<p:sld xmlns:a="http://schemas.openxmlformats.org/drawingml/2006/main" xmlns:r="http://schemas.openxmlformats.org/officeDocument/2006/relationships" xmlns:p="http://schemas.openxmlformats.org/presentationml/2006/main">
-  <p:cSld>
-    <p:spTree>
-      <p:nvGrpSpPr>
-        <p:cNvPr id="1" name=""/>
-        <p:cNvGrpSpPr/>
-        <p:nvPr/>
-      </p:nvGrpSpPr>
-      <p:grpSpPr>
-        <a:xfrm>
-          <a:off x="0" y="0"/>
-          <a:ext cx="0" cy="0"/>
-          <a:chOff x="0" y="0"/>
-          <a:chExt cx="0" cy="0"/>
-        </a:xfrm>
-      </p:grpSpPr>
-      <p:sp>
-        <p:nvSpPr>
-          <p:cNvPr id="2" name="Title 1"/>
-          <p:cNvSpPr>
-            <a:spLocks noGrp="1"/>
-          </p:cNvSpPr>
-          <p:nvPr>
-            <p:ph type="title"/>
-          </p:nvPr>
-        </p:nvSpPr>
-        <p:spPr>
-          <a:xfrm>
-            <a:off x="1445702" y="355345"/>
-            <a:ext cx="7261213" cy="958190"/>
-          </a:xfrm>
-        </p:spPr>
-        <p:txBody>
-          <a:bodyPr/>
-          <a:lstStyle/>
-          <a:p>
-            <a:r>
-              <a:rPr lang="en-US" dirty="0" smtClean="0"/>
-              <a:t>Some Axioms of Set Theory</a:t>
-            </a:r>
-            <a:endParaRPr lang="en-US" dirty="0"/>
-          </a:p>
-        </p:txBody>
-      </p:sp>
-      <p:sp>
-        <p:nvSpPr>
-          <p:cNvPr id="8" name="TextBox 7"/>
-          <p:cNvSpPr txBox="1"/>
-          <p:nvPr/>
-        </p:nvSpPr>
-        <p:spPr>
-          <a:xfrm>
-            <a:off x="509774" y="1550831"/>
-            <a:ext cx="2525551" cy="707886"/>
-          </a:xfrm>
-          <a:prstGeom prst="rect">
-            <a:avLst/>
-          </a:prstGeom>
-          <a:noFill/>
-        </p:spPr>
-        <p:txBody>
-          <a:bodyPr wrap="none" rtlCol="0">
-            <a:spAutoFit/>
-          </a:bodyPr>
-          <a:lstStyle/>
-          <a:p>
-            <a:r>
-              <a:rPr lang="en-US" sz="4000" dirty="0" smtClean="0">
-                <a:solidFill>
-                  <a:srgbClr val="9933FF"/>
-                </a:solidFill>
-                <a:latin typeface="Comic Sans MS"/>
-                <a:cs typeface="Comic Sans MS"/>
-              </a:rPr>
-              <a:t>Power set</a:t>
-            </a:r>
-          </a:p>
-        </p:txBody>
-      </p:sp>
-      <p:graphicFrame>
-        <p:nvGraphicFramePr>
-          <p:cNvPr id="638979" name="Object 3"/>
-          <p:cNvGraphicFramePr>
-            <a:graphicFrameLocks noChangeAspect="1"/>
-          </p:cNvGraphicFramePr>
-          <p:nvPr>
-            <p:extLst>
-              <p:ext uri="{D42A27DB-BD31-4B8C-83A1-F6EECF244321}">
-                <p14:modId xmlns:p14="http://schemas.microsoft.com/office/powerpoint/2010/main" val="731576250"/>
-              </p:ext>
-            </p:extLst>
-          </p:nvPr>
-        </p:nvGraphicFramePr>
-        <p:xfrm>
-          <a:off x="802542" y="3429000"/>
-          <a:ext cx="7192963" cy="1001713"/>
-        </p:xfrm>
-        <a:graphic>
-          <a:graphicData uri="http://schemas.openxmlformats.org/presentationml/2006/ole">
-            <mc:AlternateContent xmlns:mc="http://schemas.openxmlformats.org/markup-compatibility/2006">
-              <mc:Choice xmlns:v="urn:schemas-microsoft-com:vml" Requires="v">
-                <p:oleObj spid="_x0000_s60426" name="Equation" r:id="rId5" imgW="1549400" imgH="215900" progId="Equation.DSMT4">
-                  <p:embed/>
-                </p:oleObj>
-              </mc:Choice>
-              <mc:Fallback>
-                <p:oleObj name="Equation" r:id="rId5" imgW="1549400" imgH="215900" progId="Equation.DSMT4">
-                  <p:embed/>
-                  <p:pic>
-                    <p:nvPicPr>
-                      <p:cNvPr id="0" name=""/>
-                      <p:cNvPicPr>
-                        <a:picLocks noChangeAspect="1" noChangeArrowheads="1"/>
-                      </p:cNvPicPr>
-                      <p:nvPr/>
-                    </p:nvPicPr>
-                    <p:blipFill>
-                      <a:blip r:embed="rId6"/>
-                      <a:srcRect/>
-                      <a:stretch>
-                        <a:fillRect/>
-                      </a:stretch>
-                    </p:blipFill>
-                    <p:spPr bwMode="auto">
-                      <a:xfrm>
-                        <a:off x="802542" y="3429000"/>
-                        <a:ext cx="7192963" cy="1001713"/>
-                      </a:xfrm>
-                      <a:prstGeom prst="rect">
-                        <a:avLst/>
-                      </a:prstGeom>
-                      <a:noFill/>
-                      <a:extLst>
-                        <a:ext uri="{909E8E84-426E-40dd-AFC4-6F175D3DCCD1}">
-                          <a14:hiddenFill xmlns:a14="http://schemas.microsoft.com/office/drawing/2010/main">
-                            <a:solidFill>
-                              <a:srgbClr val="FFFFFF"/>
-                            </a:solidFill>
-                          </a14:hiddenFill>
-                        </a:ext>
-                      </a:extLst>
-                    </p:spPr>
-                  </p:pic>
-                </p:oleObj>
-              </mc:Fallback>
-            </mc:AlternateContent>
-          </a:graphicData>
-        </a:graphic>
-      </p:graphicFrame>
-      <p:sp>
-        <p:nvSpPr>
-          <p:cNvPr id="3" name="TextBox 2"/>
-          <p:cNvSpPr txBox="1"/>
-          <p:nvPr/>
-        </p:nvSpPr>
-        <p:spPr>
-          <a:xfrm>
-            <a:off x="783390" y="2302816"/>
-            <a:ext cx="7587534" cy="830997"/>
-          </a:xfrm>
-          <a:prstGeom prst="rect">
-            <a:avLst/>
-          </a:prstGeom>
-          <a:noFill/>
-        </p:spPr>
-        <p:txBody>
-          <a:bodyPr wrap="none" rtlCol="0">
-            <a:spAutoFit/>
-          </a:bodyPr>
-          <a:lstStyle/>
-          <a:p>
-            <a:r>
-              <a:rPr lang="en-US" sz="4800" dirty="0" smtClean="0">
-                <a:latin typeface="Comic Sans MS"/>
-                <a:cs typeface="Comic Sans MS"/>
-              </a:rPr>
-              <a:t>Every set has a power set</a:t>
-            </a:r>
-            <a:endParaRPr lang="en-US" sz="4800" dirty="0" smtClean="0">
-              <a:latin typeface="Comic Sans MS"/>
-              <a:cs typeface="Comic Sans MS"/>
-            </a:endParaRPr>
-          </a:p>
-        </p:txBody>
-      </p:sp>
-    </p:spTree>
-    <p:custDataLst>
-      <p:tags r:id="rId2"/>
-    </p:custDataLst>
-    <p:extLst>
-      <p:ext uri="{BB962C8B-B14F-4D97-AF65-F5344CB8AC3E}">
-        <p14:creationId xmlns:p14="http://schemas.microsoft.com/office/powerpoint/2010/main" val="3774924690"/>
-      </p:ext>
-    </p:extLst>
-  </p:cSld>
-  <p:clrMapOvr>
-    <a:masterClrMapping/>
-  </p:clrMapOvr>
-  <p:transition xmlns:p14="http://schemas.microsoft.com/office/powerpoint/2010/main" spd="slow" advClick="0">
-    <p:fade thruBlk="1"/>
-  </p:transition>
-  <p:timing>
-    <p:tnLst>
-      <p:par>
-        <p:cTn xmlns:p14="http://schemas.microsoft.com/office/powerpoint/2010/main" id="1" dur="indefinite" restart="never" nodeType="tmRoot">
-          <p:childTnLst>
-            <p:seq concurrent="1" nextAc="seek">
-              <p:cTn id="2" dur="indefinite" nodeType="mainSeq">
-                <p:childTnLst>
-                  <p:par>
-                    <p:cTn id="3" fill="hold">
-                      <p:stCondLst>
-                        <p:cond delay="indefinite"/>
-                      </p:stCondLst>
-                      <p:childTnLst>
-                        <p:par>
-                          <p:cTn id="4" fill="hold">
-                            <p:stCondLst>
-                              <p:cond delay="0"/>
-                            </p:stCondLst>
-                            <p:childTnLst>
-                              <p:par>
-                                <p:cTn id="5" presetID="10" presetClass="entr" presetSubtype="0" fill="hold" nodeType="clickEffect">
-                                  <p:stCondLst>
-                                    <p:cond delay="0"/>
-                                  </p:stCondLst>
-                                  <p:childTnLst>
-                                    <p:set>
-                                      <p:cBhvr>
-                                        <p:cTn id="6" dur="1" fill="hold">
-                                          <p:stCondLst>
-                                            <p:cond delay="0"/>
-                                          </p:stCondLst>
-                                        </p:cTn>
-                                        <p:tgtEl>
-                                          <p:spTgt spid="3">
-                                            <p:txEl>
-                                              <p:pRg st="0" end="0"/>
-                                            </p:txEl>
-                                          </p:spTgt>
-                                        </p:tgtEl>
-                                        <p:attrNameLst>
-                                          <p:attrName>style.visibility</p:attrName>
-                                        </p:attrNameLst>
-                                      </p:cBhvr>
-                                      <p:to>
-                                        <p:strVal val="visible"/>
-                                      </p:to>
-                                    </p:set>
-                                    <p:animEffect transition="in" filter="fade">
-                                      <p:cBhvr>
-                                        <p:cTn id="7" dur="500"/>
-                                        <p:tgtEl>
-                                          <p:spTgt spid="3">
-                                            <p:txEl>
-                                              <p:pRg st="0" end="0"/>
-                                            </p:txEl>
-                                          </p:spTgt>
-                                        </p:tgtEl>
-                                      </p:cBhvr>
-                                    </p:animEffect>
-                                  </p:childTnLst>
-                                </p:cTn>
-                              </p:par>
-                            </p:childTnLst>
-                          </p:cTn>
-                        </p:par>
-                      </p:childTnLst>
-                    </p:cTn>
-                  </p:par>
-                  <p:par>
-                    <p:cTn id="8" fill="hold">
-                      <p:stCondLst>
-                        <p:cond delay="indefinite"/>
-                      </p:stCondLst>
-                      <p:childTnLst>
-                        <p:par>
-                          <p:cTn id="9" fill="hold">
-                            <p:stCondLst>
-                              <p:cond delay="0"/>
-                            </p:stCondLst>
-                            <p:childTnLst>
-                              <p:par>
-                                <p:cTn id="10" presetID="22" presetClass="entr" presetSubtype="8" fill="hold" nodeType="clickEffect">
-                                  <p:stCondLst>
-                                    <p:cond delay="0"/>
-                                  </p:stCondLst>
-                                  <p:childTnLst>
-                                    <p:set>
-                                      <p:cBhvr>
-                                        <p:cTn id="11" dur="1" fill="hold">
-                                          <p:stCondLst>
-                                            <p:cond delay="0"/>
-                                          </p:stCondLst>
-                                        </p:cTn>
-                                        <p:tgtEl>
-                                          <p:spTgt spid="638979"/>
-                                        </p:tgtEl>
-                                        <p:attrNameLst>
-                                          <p:attrName>style.visibility</p:attrName>
-                                        </p:attrNameLst>
-                                      </p:cBhvr>
-                                      <p:to>
-                                        <p:strVal val="visible"/>
-                                      </p:to>
-                                    </p:set>
-                                    <p:animEffect transition="in" filter="wipe(left)">
-                                      <p:cBhvr>
-                                        <p:cTn id="12" dur="1000"/>
-                                        <p:tgtEl>
-                                          <p:spTgt spid="638979"/>
-                                        </p:tgtEl>
-                                      </p:cBhvr>
-                                    </p:animEffect>
-                                  </p:childTnLst>
-                                </p:cTn>
-                              </p:par>
-                            </p:childTnLst>
-                          </p:cTn>
-                        </p:par>
-                      </p:childTnLst>
-                    </p:cTn>
-                  </p:par>
-                </p:childTnLst>
-              </p:cTn>
-              <p:prevCondLst>
-                <p:cond evt="onPrev" delay="0">
-                  <p:tgtEl>
-                    <p:sldTgt/>
-                  </p:tgtEl>
-                </p:cond>
-              </p:prevCondLst>
-              <p:nextCondLst>
-                <p:cond evt="onNext" delay="0">
-                  <p:tgtEl>
-                    <p:sldTgt/>
-                  </p:tgtEl>
-                </p:cond>
-              </p:nextCondLst>
-            </p:seq>
-          </p:childTnLst>
-        </p:cTn>
-      </p:par>
-    </p:tnLst>
-  </p:timing>
-</p:sld>
-</file>
-
-<file path=ppt/slides/slide24.xml><?xml version="1.0" encoding="utf-8"?>
-<p:sld xmlns:a="http://schemas.openxmlformats.org/drawingml/2006/main" xmlns:r="http://schemas.openxmlformats.org/officeDocument/2006/relationships" xmlns:p="http://schemas.openxmlformats.org/presentationml/2006/main">
-  <p:cSld>
-    <p:spTree>
-      <p:nvGrpSpPr>
-        <p:cNvPr id="1" name=""/>
-        <p:cNvGrpSpPr/>
-        <p:nvPr/>
-      </p:nvGrpSpPr>
-      <p:grpSpPr>
-        <a:xfrm>
-          <a:off x="0" y="0"/>
-          <a:ext cx="0" cy="0"/>
-          <a:chOff x="0" y="0"/>
-          <a:chExt cx="0" cy="0"/>
-        </a:xfrm>
-      </p:grpSpPr>
-      <p:sp>
-        <p:nvSpPr>
-          <p:cNvPr id="3" name="Content Placeholder 2"/>
-          <p:cNvSpPr>
-            <a:spLocks noGrp="1"/>
-          </p:cNvSpPr>
-          <p:nvPr>
-            <p:ph idx="1"/>
-          </p:nvPr>
-        </p:nvSpPr>
-        <p:spPr>
-          <a:xfrm>
-            <a:off x="457200" y="1600201"/>
-            <a:ext cx="8481141" cy="4577051"/>
-          </a:xfrm>
-        </p:spPr>
-        <p:txBody>
-          <a:bodyPr/>
-          <a:lstStyle/>
-          <a:p>
-            <a:pPr>
-              <a:spcBef>
-                <a:spcPct val="50000"/>
-              </a:spcBef>
-            </a:pPr>
-            <a:r>
-              <a:rPr lang="en-US" sz="4400" dirty="0" smtClean="0"/>
-              <a:t>According to ZF, the elements of a set have to be “simpler” than the set itself.  In particular,</a:t>
-            </a:r>
-          </a:p>
-          <a:p>
-            <a:pPr>
-              <a:lnSpc>
-                <a:spcPct val="60000"/>
-              </a:lnSpc>
-              <a:spcBef>
-                <a:spcPct val="50000"/>
-              </a:spcBef>
-            </a:pPr>
-            <a:r>
-              <a:rPr lang="en-US" sz="4800" dirty="0" smtClean="0">
-                <a:solidFill>
-                  <a:srgbClr val="0000FF"/>
-                </a:solidFill>
-              </a:rPr>
-              <a:t>no set is a member of itself,</a:t>
-            </a:r>
-          </a:p>
-          <a:p>
-            <a:pPr>
-              <a:lnSpc>
-                <a:spcPct val="60000"/>
-              </a:lnSpc>
-              <a:spcBef>
-                <a:spcPct val="50000"/>
-              </a:spcBef>
-            </a:pPr>
-            <a:r>
-              <a:rPr lang="en-US" sz="4800" dirty="0" smtClean="0">
-                <a:solidFill>
-                  <a:srgbClr val="0000FF"/>
-                </a:solidFill>
-              </a:rPr>
-              <a:t>or a member of a member…</a:t>
-            </a:r>
-          </a:p>
-        </p:txBody>
-      </p:sp>
-      <p:sp>
-        <p:nvSpPr>
-          <p:cNvPr id="6" name="Title 1"/>
-          <p:cNvSpPr>
-            <a:spLocks noGrp="1"/>
-          </p:cNvSpPr>
-          <p:nvPr>
-            <p:ph type="title"/>
-          </p:nvPr>
-        </p:nvSpPr>
-        <p:spPr/>
-        <p:txBody>
-          <a:bodyPr/>
-          <a:lstStyle/>
-          <a:p>
-            <a:r>
-              <a:rPr lang="en-US" dirty="0" smtClean="0"/>
-              <a:t>Zermelo-Frankel Set Theory</a:t>
-            </a:r>
-            <a:endParaRPr lang="en-US" dirty="0"/>
-          </a:p>
-        </p:txBody>
-      </p:sp>
-    </p:spTree>
-    <p:extLst>
-      <p:ext uri="{BB962C8B-B14F-4D97-AF65-F5344CB8AC3E}">
-        <p14:creationId xmlns:p14="http://schemas.microsoft.com/office/powerpoint/2010/main" val="3714406714"/>
-      </p:ext>
-    </p:extLst>
-  </p:cSld>
-  <p:clrMapOvr>
-    <a:masterClrMapping/>
-  </p:clrMapOvr>
-  <mc:AlternateContent xmlns:mc="http://schemas.openxmlformats.org/markup-compatibility/2006" xmlns:p14="http://schemas.microsoft.com/office/powerpoint/2010/main">
-    <mc:Choice Requires="p14">
-      <p:transition spd="slow" p14:dur="900" advClick="0">
-        <p:fade/>
-      </p:transition>
-    </mc:Choice>
-    <mc:Fallback xmlns="">
-      <p:transition xmlns:p14="http://schemas.microsoft.com/office/powerpoint/2010/main" spd="slow" advClick="0">
-        <p:fade/>
-      </p:transition>
-    </mc:Fallback>
-  </mc:AlternateContent>
-  <p:timing>
-    <p:tnLst>
-      <p:par>
-        <p:cTn xmlns:p14="http://schemas.microsoft.com/office/powerpoint/2010/main" id="1" dur="indefinite" restart="never" nodeType="tmRoot">
-          <p:childTnLst>
-            <p:seq concurrent="1" nextAc="seek">
-              <p:cTn id="2" dur="indefinite" nodeType="mainSeq">
-                <p:childTnLst>
-                  <p:par>
-                    <p:cTn id="3" fill="hold">
-                      <p:stCondLst>
-                        <p:cond delay="indefinite"/>
-                      </p:stCondLst>
-                      <p:childTnLst>
-                        <p:par>
-                          <p:cTn id="4" fill="hold">
-                            <p:stCondLst>
-                              <p:cond delay="0"/>
-                            </p:stCondLst>
-                            <p:childTnLst>
-                              <p:par>
-                                <p:cTn id="5" presetID="9" presetClass="entr" presetSubtype="0" fill="hold" nodeType="clickEffect">
-                                  <p:stCondLst>
-                                    <p:cond delay="0"/>
-                                  </p:stCondLst>
-                                  <p:childTnLst>
-                                    <p:set>
-                                      <p:cBhvr>
-                                        <p:cTn id="6" dur="1" fill="hold">
-                                          <p:stCondLst>
-                                            <p:cond delay="0"/>
-                                          </p:stCondLst>
-                                        </p:cTn>
-                                        <p:tgtEl>
-                                          <p:spTgt spid="3">
-                                            <p:txEl>
-                                              <p:pRg st="1" end="1"/>
-                                            </p:txEl>
-                                          </p:spTgt>
-                                        </p:tgtEl>
-                                        <p:attrNameLst>
-                                          <p:attrName>style.visibility</p:attrName>
-                                        </p:attrNameLst>
-                                      </p:cBhvr>
-                                      <p:to>
-                                        <p:strVal val="visible"/>
-                                      </p:to>
-                                    </p:set>
-                                    <p:animEffect transition="in" filter="dissolve">
-                                      <p:cBhvr>
-                                        <p:cTn id="7" dur="500"/>
-                                        <p:tgtEl>
-                                          <p:spTgt spid="3">
-                                            <p:txEl>
-                                              <p:pRg st="1" end="1"/>
-                                            </p:txEl>
-                                          </p:spTgt>
-                                        </p:tgtEl>
-                                      </p:cBhvr>
-                                    </p:animEffect>
-                                  </p:childTnLst>
-                                </p:cTn>
-                              </p:par>
-                            </p:childTnLst>
-                          </p:cTn>
-                        </p:par>
-                      </p:childTnLst>
-                    </p:cTn>
-                  </p:par>
-                  <p:par>
-                    <p:cTn id="8" fill="hold">
-                      <p:stCondLst>
-                        <p:cond delay="indefinite"/>
-                      </p:stCondLst>
-                      <p:childTnLst>
-                        <p:par>
-                          <p:cTn id="9" fill="hold">
-                            <p:stCondLst>
-                              <p:cond delay="0"/>
-                            </p:stCondLst>
-                            <p:childTnLst>
-                              <p:par>
-                                <p:cTn id="10" presetID="9" presetClass="entr" presetSubtype="0" fill="hold" nodeType="clickEffect">
-                                  <p:stCondLst>
-                                    <p:cond delay="0"/>
-                                  </p:stCondLst>
-                                  <p:childTnLst>
-                                    <p:set>
-                                      <p:cBhvr>
-                                        <p:cTn id="11" dur="1" fill="hold">
-                                          <p:stCondLst>
-                                            <p:cond delay="0"/>
-                                          </p:stCondLst>
-                                        </p:cTn>
-                                        <p:tgtEl>
-                                          <p:spTgt spid="3">
-                                            <p:txEl>
-                                              <p:pRg st="2" end="2"/>
-                                            </p:txEl>
-                                          </p:spTgt>
-                                        </p:tgtEl>
-                                        <p:attrNameLst>
-                                          <p:attrName>style.visibility</p:attrName>
-                                        </p:attrNameLst>
-                                      </p:cBhvr>
-                                      <p:to>
-                                        <p:strVal val="visible"/>
-                                      </p:to>
-                                    </p:set>
-                                    <p:animEffect transition="in" filter="dissolve">
-                                      <p:cBhvr>
-                                        <p:cTn id="12" dur="500"/>
-                                        <p:tgtEl>
-                                          <p:spTgt spid="3">
-                                            <p:txEl>
-                                              <p:pRg st="2" end="2"/>
-                                            </p:txEl>
-                                          </p:spTgt>
-                                        </p:tgtEl>
-                                      </p:cBhvr>
-                                    </p:animEffect>
-                                  </p:childTnLst>
-                                </p:cTn>
-                              </p:par>
-                            </p:childTnLst>
-                          </p:cTn>
-                        </p:par>
-                      </p:childTnLst>
-                    </p:cTn>
-                  </p:par>
-                </p:childTnLst>
-              </p:cTn>
-              <p:prevCondLst>
-                <p:cond evt="onPrev" delay="0">
-                  <p:tgtEl>
-                    <p:sldTgt/>
-                  </p:tgtEl>
-                </p:cond>
-              </p:prevCondLst>
-              <p:nextCondLst>
-                <p:cond evt="onNext" delay="0">
-                  <p:tgtEl>
-                    <p:sldTgt/>
-                  </p:tgtEl>
-                </p:cond>
-              </p:nextCondLst>
-            </p:seq>
-          </p:childTnLst>
-        </p:cTn>
-      </p:par>
-    </p:tnLst>
-  </p:timing>
-</p:sld>
-</file>
-
-<file path=ppt/slides/slide25.xml><?xml version="1.0" encoding="utf-8"?>
-<p:sld xmlns:a="http://schemas.openxmlformats.org/drawingml/2006/main" xmlns:r="http://schemas.openxmlformats.org/officeDocument/2006/relationships" xmlns:p="http://schemas.openxmlformats.org/presentationml/2006/main">
-  <p:cSld>
-    <p:spTree>
-      <p:nvGrpSpPr>
-        <p:cNvPr id="1" name=""/>
-        <p:cNvGrpSpPr/>
-        <p:nvPr/>
-      </p:nvGrpSpPr>
-      <p:grpSpPr>
-        <a:xfrm>
-          <a:off x="0" y="0"/>
-          <a:ext cx="0" cy="0"/>
-          <a:chOff x="0" y="0"/>
-          <a:chExt cx="0" cy="0"/>
-        </a:xfrm>
-      </p:grpSpPr>
-      <p:sp>
-        <p:nvSpPr>
-          <p:cNvPr id="2" name="Title 1"/>
-          <p:cNvSpPr>
-            <a:spLocks noGrp="1"/>
-          </p:cNvSpPr>
-          <p:nvPr>
-            <p:ph type="title"/>
-          </p:nvPr>
-        </p:nvSpPr>
-        <p:spPr>
-          <a:xfrm>
-            <a:off x="1445702" y="355345"/>
-            <a:ext cx="7261213" cy="958190"/>
-          </a:xfrm>
-        </p:spPr>
-        <p:txBody>
-          <a:bodyPr/>
-          <a:lstStyle/>
-          <a:p>
-            <a:r>
-              <a:rPr lang="en-US" dirty="0" smtClean="0"/>
-              <a:t>Some Axioms of Set Theory</a:t>
-            </a:r>
-            <a:endParaRPr lang="en-US" dirty="0"/>
-          </a:p>
-        </p:txBody>
-      </p:sp>
-      <p:sp>
-        <p:nvSpPr>
-          <p:cNvPr id="8" name="TextBox 7"/>
-          <p:cNvSpPr txBox="1"/>
-          <p:nvPr/>
-        </p:nvSpPr>
-        <p:spPr>
-          <a:xfrm>
-            <a:off x="509774" y="1550831"/>
-            <a:ext cx="2788544" cy="707886"/>
-          </a:xfrm>
-          <a:prstGeom prst="rect">
-            <a:avLst/>
-          </a:prstGeom>
-          <a:noFill/>
-        </p:spPr>
-        <p:txBody>
-          <a:bodyPr wrap="none" rtlCol="0">
-            <a:spAutoFit/>
-          </a:bodyPr>
-          <a:lstStyle/>
-          <a:p>
-            <a:r>
-              <a:rPr lang="en-US" sz="4000" dirty="0" smtClean="0">
-                <a:solidFill>
-                  <a:srgbClr val="9933FF"/>
-                </a:solidFill>
-                <a:latin typeface="Comic Sans MS"/>
-                <a:cs typeface="Comic Sans MS"/>
-              </a:rPr>
-              <a:t>Foundation</a:t>
-            </a:r>
-            <a:endParaRPr lang="en-US" sz="4000" dirty="0" smtClean="0">
-              <a:solidFill>
-                <a:srgbClr val="9933FF"/>
-              </a:solidFill>
-              <a:latin typeface="Comic Sans MS"/>
-              <a:cs typeface="Comic Sans MS"/>
-            </a:endParaRPr>
-          </a:p>
-        </p:txBody>
-      </p:sp>
-      <p:sp>
-        <p:nvSpPr>
-          <p:cNvPr id="3" name="TextBox 2"/>
-          <p:cNvSpPr txBox="1"/>
-          <p:nvPr/>
-        </p:nvSpPr>
-        <p:spPr>
-          <a:xfrm>
-            <a:off x="925830" y="2255336"/>
-            <a:ext cx="7183577" cy="830997"/>
-          </a:xfrm>
-          <a:prstGeom prst="rect">
-            <a:avLst/>
-          </a:prstGeom>
-          <a:noFill/>
-        </p:spPr>
-        <p:txBody>
-          <a:bodyPr wrap="none" rtlCol="0">
-            <a:spAutoFit/>
-          </a:bodyPr>
-          <a:lstStyle/>
-          <a:p>
-            <a:r>
-              <a:rPr lang="en-US" sz="4800" dirty="0" smtClean="0">
-                <a:solidFill>
-                  <a:srgbClr val="0000FF"/>
-                </a:solidFill>
-                <a:latin typeface="Comic Sans MS"/>
-                <a:cs typeface="Comic Sans MS"/>
-              </a:rPr>
-              <a:t>x</a:t>
-            </a:r>
-            <a:r>
-              <a:rPr lang="en-US" sz="4800" dirty="0" smtClean="0">
-                <a:latin typeface="Comic Sans MS"/>
-                <a:cs typeface="Comic Sans MS"/>
-              </a:rPr>
-              <a:t> is member-minimal in </a:t>
-            </a:r>
-            <a:r>
-              <a:rPr lang="en-US" sz="4800" dirty="0" smtClean="0">
-                <a:solidFill>
-                  <a:srgbClr val="0000FF"/>
-                </a:solidFill>
-                <a:latin typeface="Comic Sans MS"/>
-                <a:cs typeface="Comic Sans MS"/>
-              </a:rPr>
-              <a:t>y</a:t>
-            </a:r>
-            <a:endParaRPr lang="en-US" sz="4800" dirty="0" smtClean="0">
-              <a:solidFill>
-                <a:srgbClr val="0000FF"/>
-              </a:solidFill>
-              <a:latin typeface="Comic Sans MS"/>
-              <a:cs typeface="Comic Sans MS"/>
-            </a:endParaRPr>
-          </a:p>
-        </p:txBody>
-      </p:sp>
-    </p:spTree>
-    <p:custDataLst>
-      <p:tags r:id="rId1"/>
-    </p:custDataLst>
-    <p:extLst>
-      <p:ext uri="{BB962C8B-B14F-4D97-AF65-F5344CB8AC3E}">
-        <p14:creationId xmlns:p14="http://schemas.microsoft.com/office/powerpoint/2010/main" val="3048457193"/>
-      </p:ext>
-    </p:extLst>
-  </p:cSld>
-  <p:clrMapOvr>
-    <a:masterClrMapping/>
-  </p:clrMapOvr>
-  <p:transition xmlns:p14="http://schemas.microsoft.com/office/powerpoint/2010/main" spd="slow" advClick="0">
-    <p:fade thruBlk="1"/>
-  </p:transition>
-  <p:timing>
-    <p:tnLst>
-      <p:par>
-        <p:cTn xmlns:p14="http://schemas.microsoft.com/office/powerpoint/2010/main" id="1" dur="indefinite" restart="never" nodeType="tmRoot">
-          <p:childTnLst>
-            <p:seq concurrent="1" nextAc="seek">
-              <p:cTn id="2" dur="indefinite" nodeType="mainSeq">
-                <p:childTnLst>
-                  <p:par>
-                    <p:cTn id="3" fill="hold">
-                      <p:stCondLst>
-                        <p:cond delay="indefinite"/>
-                      </p:stCondLst>
-                      <p:childTnLst>
-                        <p:par>
-                          <p:cTn id="4" fill="hold">
-                            <p:stCondLst>
-                              <p:cond delay="0"/>
-                            </p:stCondLst>
-                            <p:childTnLst>
-                              <p:par>
-                                <p:cTn id="5" presetID="10" presetClass="entr" presetSubtype="0" fill="hold" nodeType="clickEffect">
-                                  <p:stCondLst>
-                                    <p:cond delay="0"/>
-                                  </p:stCondLst>
-                                  <p:childTnLst>
-                                    <p:set>
-                                      <p:cBhvr>
-                                        <p:cTn id="6" dur="1" fill="hold">
-                                          <p:stCondLst>
-                                            <p:cond delay="0"/>
-                                          </p:stCondLst>
-                                        </p:cTn>
-                                        <p:tgtEl>
-                                          <p:spTgt spid="3">
-                                            <p:txEl>
-                                              <p:pRg st="0" end="0"/>
-                                            </p:txEl>
-                                          </p:spTgt>
-                                        </p:tgtEl>
-                                        <p:attrNameLst>
-                                          <p:attrName>style.visibility</p:attrName>
-                                        </p:attrNameLst>
-                                      </p:cBhvr>
-                                      <p:to>
-                                        <p:strVal val="visible"/>
-                                      </p:to>
-                                    </p:set>
-                                    <p:animEffect transition="in" filter="fade">
-                                      <p:cBhvr>
-                                        <p:cTn id="7" dur="500"/>
-                                        <p:tgtEl>
-                                          <p:spTgt spid="3">
-                                            <p:txEl>
-                                              <p:pRg st="0" end="0"/>
-                                            </p:txEl>
-                                          </p:spTgt>
-                                        </p:tgtEl>
-                                      </p:cBhvr>
-                                    </p:animEffect>
-                                  </p:childTnLst>
-                                </p:cTn>
-                              </p:par>
-                            </p:childTnLst>
-                          </p:cTn>
-                        </p:par>
-                      </p:childTnLst>
-                    </p:cTn>
-                  </p:par>
-                </p:childTnLst>
-              </p:cTn>
-              <p:prevCondLst>
-                <p:cond evt="onPrev" delay="0">
-                  <p:tgtEl>
-                    <p:sldTgt/>
-                  </p:tgtEl>
-                </p:cond>
-              </p:prevCondLst>
-              <p:nextCondLst>
-                <p:cond evt="onNext" delay="0">
-                  <p:tgtEl>
-                    <p:sldTgt/>
-                  </p:tgtEl>
-                </p:cond>
-              </p:nextCondLst>
-            </p:seq>
-          </p:childTnLst>
-        </p:cTn>
-      </p:par>
-    </p:tnLst>
-  </p:timing>
-</p:sld>
-</file>
-
-<file path=ppt/slides/slide26.xml><?xml version="1.0" encoding="utf-8"?>
-<p:sld xmlns:a="http://schemas.openxmlformats.org/drawingml/2006/main" xmlns:r="http://schemas.openxmlformats.org/officeDocument/2006/relationships" xmlns:p="http://schemas.openxmlformats.org/presentationml/2006/main">
-  <p:cSld>
-    <p:spTree>
-      <p:nvGrpSpPr>
-        <p:cNvPr id="1" name=""/>
-        <p:cNvGrpSpPr/>
-        <p:nvPr/>
-      </p:nvGrpSpPr>
-      <p:grpSpPr>
-        <a:xfrm>
-          <a:off x="0" y="0"/>
-          <a:ext cx="0" cy="0"/>
-          <a:chOff x="0" y="0"/>
-          <a:chExt cx="0" cy="0"/>
-        </a:xfrm>
-      </p:grpSpPr>
-      <p:sp>
-        <p:nvSpPr>
-          <p:cNvPr id="2" name="Title 1"/>
-          <p:cNvSpPr>
-            <a:spLocks noGrp="1"/>
-          </p:cNvSpPr>
-          <p:nvPr>
-            <p:ph type="title"/>
-          </p:nvPr>
-        </p:nvSpPr>
-        <p:spPr>
-          <a:xfrm>
-            <a:off x="1445702" y="355345"/>
-            <a:ext cx="7261213" cy="958190"/>
-          </a:xfrm>
-        </p:spPr>
-        <p:txBody>
-          <a:bodyPr/>
-          <a:lstStyle/>
-          <a:p>
-            <a:r>
-              <a:rPr lang="en-US" dirty="0" smtClean="0"/>
-              <a:t>Some Axioms of Set Theory</a:t>
-            </a:r>
-            <a:endParaRPr lang="en-US" dirty="0"/>
-          </a:p>
-        </p:txBody>
-      </p:sp>
-      <p:sp>
-        <p:nvSpPr>
-          <p:cNvPr id="8" name="TextBox 7"/>
-          <p:cNvSpPr txBox="1"/>
-          <p:nvPr/>
-        </p:nvSpPr>
-        <p:spPr>
-          <a:xfrm>
-            <a:off x="509774" y="1550831"/>
-            <a:ext cx="2788544" cy="707886"/>
-          </a:xfrm>
-          <a:prstGeom prst="rect">
-            <a:avLst/>
-          </a:prstGeom>
-          <a:noFill/>
-        </p:spPr>
-        <p:txBody>
-          <a:bodyPr wrap="none" rtlCol="0">
-            <a:spAutoFit/>
-          </a:bodyPr>
-          <a:lstStyle/>
-          <a:p>
-            <a:r>
-              <a:rPr lang="en-US" sz="4000" dirty="0" smtClean="0">
-                <a:solidFill>
-                  <a:srgbClr val="9933FF"/>
-                </a:solidFill>
-                <a:latin typeface="Comic Sans MS"/>
-                <a:cs typeface="Comic Sans MS"/>
-              </a:rPr>
-              <a:t>Foundation</a:t>
-            </a:r>
-            <a:endParaRPr lang="en-US" sz="4000" dirty="0" smtClean="0">
-              <a:solidFill>
-                <a:srgbClr val="9933FF"/>
-              </a:solidFill>
-              <a:latin typeface="Comic Sans MS"/>
-              <a:cs typeface="Comic Sans MS"/>
-            </a:endParaRPr>
-          </a:p>
-        </p:txBody>
-      </p:sp>
-      <p:sp>
-        <p:nvSpPr>
-          <p:cNvPr id="3" name="TextBox 2"/>
-          <p:cNvSpPr txBox="1"/>
-          <p:nvPr/>
-        </p:nvSpPr>
-        <p:spPr>
-          <a:xfrm>
-            <a:off x="925830" y="2255336"/>
-            <a:ext cx="7183577" cy="830997"/>
-          </a:xfrm>
-          <a:prstGeom prst="rect">
-            <a:avLst/>
-          </a:prstGeom>
-          <a:noFill/>
-        </p:spPr>
-        <p:txBody>
-          <a:bodyPr wrap="none" rtlCol="0">
-            <a:spAutoFit/>
-          </a:bodyPr>
-          <a:lstStyle/>
-          <a:p>
-            <a:r>
-              <a:rPr lang="en-US" sz="4800" dirty="0" smtClean="0">
-                <a:solidFill>
-                  <a:srgbClr val="0000FF"/>
-                </a:solidFill>
-                <a:latin typeface="Comic Sans MS"/>
-                <a:cs typeface="Comic Sans MS"/>
-              </a:rPr>
-              <a:t>x</a:t>
-            </a:r>
-            <a:r>
-              <a:rPr lang="en-US" sz="4800" dirty="0" smtClean="0">
-                <a:latin typeface="Comic Sans MS"/>
-                <a:cs typeface="Comic Sans MS"/>
-              </a:rPr>
-              <a:t> is member-minimal in </a:t>
-            </a:r>
-            <a:r>
-              <a:rPr lang="en-US" sz="4800" dirty="0" smtClean="0">
-                <a:solidFill>
-                  <a:srgbClr val="0000FF"/>
-                </a:solidFill>
-                <a:latin typeface="Comic Sans MS"/>
-                <a:cs typeface="Comic Sans MS"/>
-              </a:rPr>
-              <a:t>y</a:t>
-            </a:r>
-            <a:endParaRPr lang="en-US" sz="4800" dirty="0" smtClean="0">
-              <a:solidFill>
-                <a:srgbClr val="0000FF"/>
-              </a:solidFill>
-              <a:latin typeface="Comic Sans MS"/>
-              <a:cs typeface="Comic Sans MS"/>
-            </a:endParaRPr>
-          </a:p>
-        </p:txBody>
-      </p:sp>
-      <p:graphicFrame>
-        <p:nvGraphicFramePr>
-          <p:cNvPr id="4" name="Object 3"/>
-          <p:cNvGraphicFramePr>
-            <a:graphicFrameLocks noChangeAspect="1"/>
-          </p:cNvGraphicFramePr>
-          <p:nvPr>
-            <p:extLst>
-              <p:ext uri="{D42A27DB-BD31-4B8C-83A1-F6EECF244321}">
-                <p14:modId xmlns:p14="http://schemas.microsoft.com/office/powerpoint/2010/main" val="2684427476"/>
-              </p:ext>
-            </p:extLst>
-          </p:nvPr>
-        </p:nvGraphicFramePr>
-        <p:xfrm>
-          <a:off x="881857" y="3253974"/>
-          <a:ext cx="7383462" cy="1692275"/>
-        </p:xfrm>
-        <a:graphic>
-          <a:graphicData uri="http://schemas.openxmlformats.org/presentationml/2006/ole">
-            <mc:AlternateContent xmlns:mc="http://schemas.openxmlformats.org/markup-compatibility/2006">
-              <mc:Choice xmlns:v="urn:schemas-microsoft-com:vml" Requires="v">
-                <p:oleObj spid="_x0000_s66564" name="Equation" r:id="rId5" imgW="1879600" imgH="431800" progId="Equation.DSMT4">
-                  <p:embed/>
-                </p:oleObj>
-              </mc:Choice>
-              <mc:Fallback>
-                <p:oleObj name="Equation" r:id="rId5" imgW="1879600" imgH="431800" progId="Equation.DSMT4">
-                  <p:embed/>
-                  <p:pic>
-                    <p:nvPicPr>
-                      <p:cNvPr id="0" name=""/>
-                      <p:cNvPicPr/>
-                      <p:nvPr/>
-                    </p:nvPicPr>
-                    <p:blipFill>
-                      <a:blip r:embed="rId6"/>
-                      <a:stretch>
-                        <a:fillRect/>
-                      </a:stretch>
-                    </p:blipFill>
-                    <p:spPr>
-                      <a:xfrm>
-                        <a:off x="881857" y="3253974"/>
-                        <a:ext cx="7383462" cy="1692275"/>
-                      </a:xfrm>
-                      <a:prstGeom prst="rect">
-                        <a:avLst/>
-                      </a:prstGeom>
-                    </p:spPr>
-                  </p:pic>
-                </p:oleObj>
-              </mc:Fallback>
-            </mc:AlternateContent>
-          </a:graphicData>
-        </a:graphic>
-      </p:graphicFrame>
-    </p:spTree>
-    <p:custDataLst>
-      <p:tags r:id="rId2"/>
-    </p:custDataLst>
-    <p:extLst>
-      <p:ext uri="{BB962C8B-B14F-4D97-AF65-F5344CB8AC3E}">
-        <p14:creationId xmlns:p14="http://schemas.microsoft.com/office/powerpoint/2010/main" val="2183012316"/>
-      </p:ext>
-    </p:extLst>
-  </p:cSld>
-  <p:clrMapOvr>
-    <a:masterClrMapping/>
-  </p:clrMapOvr>
-  <p:transition xmlns:p14="http://schemas.microsoft.com/office/powerpoint/2010/main" spd="slow" advClick="0">
-    <p:fade thruBlk="1"/>
-  </p:transition>
-  <p:timing>
-    <p:tnLst>
-      <p:par>
-        <p:cTn xmlns:p14="http://schemas.microsoft.com/office/powerpoint/2010/main" id="1" dur="indefinite" restart="never" nodeType="tmRoot">
-          <p:childTnLst>
-            <p:seq concurrent="1" nextAc="seek">
-              <p:cTn id="2" dur="indefinite" nodeType="mainSeq">
-                <p:childTnLst>
-                  <p:par>
-                    <p:cTn id="3" fill="hold">
-                      <p:stCondLst>
-                        <p:cond delay="indefinite"/>
-                      </p:stCondLst>
-                      <p:childTnLst>
-                        <p:par>
-                          <p:cTn id="4" fill="hold">
-                            <p:stCondLst>
-                              <p:cond delay="0"/>
-                            </p:stCondLst>
-                            <p:childTnLst>
-                              <p:par>
-                                <p:cTn id="5" presetID="10" presetClass="entr" presetSubtype="0" fill="hold" nodeType="clickEffect">
-                                  <p:stCondLst>
-                                    <p:cond delay="0"/>
-                                  </p:stCondLst>
-                                  <p:childTnLst>
-                                    <p:set>
-                                      <p:cBhvr>
-                                        <p:cTn id="6" dur="1" fill="hold">
-                                          <p:stCondLst>
-                                            <p:cond delay="0"/>
-                                          </p:stCondLst>
-                                        </p:cTn>
-                                        <p:tgtEl>
-                                          <p:spTgt spid="4"/>
-                                        </p:tgtEl>
-                                        <p:attrNameLst>
-                                          <p:attrName>style.visibility</p:attrName>
-                                        </p:attrNameLst>
-                                      </p:cBhvr>
-                                      <p:to>
-                                        <p:strVal val="visible"/>
-                                      </p:to>
-                                    </p:set>
-                                    <p:animEffect transition="in" filter="fade">
-                                      <p:cBhvr>
-                                        <p:cTn id="7" dur="500"/>
-                                        <p:tgtEl>
-                                          <p:spTgt spid="4"/>
-                                        </p:tgtEl>
-                                      </p:cBhvr>
-                                    </p:animEffect>
-                                  </p:childTnLst>
-                                </p:cTn>
-                              </p:par>
-                            </p:childTnLst>
-                          </p:cTn>
-                        </p:par>
-                      </p:childTnLst>
-                    </p:cTn>
-                  </p:par>
-                </p:childTnLst>
-              </p:cTn>
-              <p:prevCondLst>
-                <p:cond evt="onPrev" delay="0">
-                  <p:tgtEl>
-                    <p:sldTgt/>
-                  </p:tgtEl>
-                </p:cond>
-              </p:prevCondLst>
-              <p:nextCondLst>
-                <p:cond evt="onNext" delay="0">
-                  <p:tgtEl>
-                    <p:sldTgt/>
-                  </p:tgtEl>
-                </p:cond>
-              </p:nextCondLst>
-            </p:seq>
-          </p:childTnLst>
-        </p:cTn>
-      </p:par>
-    </p:tnLst>
-  </p:timing>
-</p:sld>
-</file>
-
-<file path=ppt/slides/slide27.xml><?xml version="1.0" encoding="utf-8"?>
-<p:sld xmlns:a="http://schemas.openxmlformats.org/drawingml/2006/main" xmlns:r="http://schemas.openxmlformats.org/officeDocument/2006/relationships" xmlns:p="http://schemas.openxmlformats.org/presentationml/2006/main">
-  <p:cSld>
-    <p:spTree>
-      <p:nvGrpSpPr>
-        <p:cNvPr id="1" name=""/>
-        <p:cNvGrpSpPr/>
-        <p:nvPr/>
-      </p:nvGrpSpPr>
-      <p:grpSpPr>
-        <a:xfrm>
-          <a:off x="0" y="0"/>
-          <a:ext cx="0" cy="0"/>
-          <a:chOff x="0" y="0"/>
-          <a:chExt cx="0" cy="0"/>
-        </a:xfrm>
-      </p:grpSpPr>
-      <p:sp>
-        <p:nvSpPr>
-          <p:cNvPr id="2" name="Title 1"/>
-          <p:cNvSpPr>
-            <a:spLocks noGrp="1"/>
-          </p:cNvSpPr>
-          <p:nvPr>
-            <p:ph type="title"/>
-          </p:nvPr>
-        </p:nvSpPr>
-        <p:spPr>
-          <a:xfrm>
-            <a:off x="1445702" y="355345"/>
-            <a:ext cx="7261213" cy="958190"/>
-          </a:xfrm>
-        </p:spPr>
-        <p:txBody>
-          <a:bodyPr/>
-          <a:lstStyle/>
-          <a:p>
-            <a:r>
-              <a:rPr lang="en-US" dirty="0" smtClean="0"/>
-              <a:t>Some Axioms of Set Theory</a:t>
-            </a:r>
-            <a:endParaRPr lang="en-US" dirty="0"/>
-          </a:p>
-        </p:txBody>
-      </p:sp>
-      <p:sp>
-        <p:nvSpPr>
-          <p:cNvPr id="8" name="TextBox 7"/>
-          <p:cNvSpPr txBox="1"/>
-          <p:nvPr/>
-        </p:nvSpPr>
-        <p:spPr>
-          <a:xfrm>
-            <a:off x="509774" y="1550831"/>
-            <a:ext cx="2788544" cy="707886"/>
-          </a:xfrm>
-          <a:prstGeom prst="rect">
-            <a:avLst/>
-          </a:prstGeom>
-          <a:noFill/>
-        </p:spPr>
-        <p:txBody>
-          <a:bodyPr wrap="none" rtlCol="0">
-            <a:spAutoFit/>
-          </a:bodyPr>
-          <a:lstStyle/>
-          <a:p>
-            <a:r>
-              <a:rPr lang="en-US" sz="4000" dirty="0" smtClean="0">
-                <a:solidFill>
-                  <a:srgbClr val="9933FF"/>
-                </a:solidFill>
-                <a:latin typeface="Comic Sans MS"/>
-                <a:cs typeface="Comic Sans MS"/>
-              </a:rPr>
-              <a:t>Foundation</a:t>
-            </a:r>
-            <a:endParaRPr lang="en-US" sz="4000" dirty="0" smtClean="0">
-              <a:solidFill>
-                <a:srgbClr val="9933FF"/>
-              </a:solidFill>
-              <a:latin typeface="Comic Sans MS"/>
-              <a:cs typeface="Comic Sans MS"/>
-            </a:endParaRPr>
-          </a:p>
-        </p:txBody>
-      </p:sp>
-      <p:sp>
-        <p:nvSpPr>
-          <p:cNvPr id="3" name="TextBox 2"/>
-          <p:cNvSpPr txBox="1"/>
-          <p:nvPr/>
-        </p:nvSpPr>
-        <p:spPr>
-          <a:xfrm>
-            <a:off x="659740" y="2376286"/>
-            <a:ext cx="7793720" cy="1569660"/>
-          </a:xfrm>
-          <a:prstGeom prst="rect">
-            <a:avLst/>
-          </a:prstGeom>
-          <a:noFill/>
-        </p:spPr>
-        <p:txBody>
-          <a:bodyPr wrap="none" rtlCol="0">
-            <a:spAutoFit/>
-          </a:bodyPr>
-          <a:lstStyle/>
-          <a:p>
-            <a:r>
-              <a:rPr lang="en-US" sz="4800" dirty="0" smtClean="0">
-                <a:latin typeface="Comic Sans MS"/>
-                <a:cs typeface="Comic Sans MS"/>
-              </a:rPr>
-              <a:t>Every nonempty set </a:t>
-            </a:r>
-            <a:r>
-              <a:rPr lang="en-US" sz="4800" dirty="0" smtClean="0">
-                <a:latin typeface="Comic Sans MS"/>
-                <a:cs typeface="Comic Sans MS"/>
-              </a:rPr>
-              <a:t>has</a:t>
-            </a:r>
-          </a:p>
-          <a:p>
-            <a:r>
-              <a:rPr lang="en-US" sz="4800" dirty="0" smtClean="0">
-                <a:latin typeface="Comic Sans MS"/>
-                <a:cs typeface="Comic Sans MS"/>
-              </a:rPr>
-              <a:t>a</a:t>
-            </a:r>
-            <a:r>
-              <a:rPr lang="en-US" sz="4800" dirty="0" smtClean="0">
-                <a:latin typeface="Comic Sans MS"/>
-                <a:cs typeface="Comic Sans MS"/>
-              </a:rPr>
-              <a:t> member-minimal element</a:t>
-            </a:r>
-            <a:endParaRPr lang="en-US" sz="4800" dirty="0" smtClean="0">
-              <a:latin typeface="Comic Sans MS"/>
-              <a:cs typeface="Comic Sans MS"/>
-            </a:endParaRPr>
-          </a:p>
-        </p:txBody>
-      </p:sp>
-    </p:spTree>
-    <p:custDataLst>
-      <p:tags r:id="rId1"/>
-    </p:custDataLst>
-    <p:extLst>
-      <p:ext uri="{BB962C8B-B14F-4D97-AF65-F5344CB8AC3E}">
-        <p14:creationId xmlns:p14="http://schemas.microsoft.com/office/powerpoint/2010/main" val="1403886801"/>
-      </p:ext>
-    </p:extLst>
-  </p:cSld>
-  <p:clrMapOvr>
-    <a:masterClrMapping/>
-  </p:clrMapOvr>
-  <p:transition xmlns:p14="http://schemas.microsoft.com/office/powerpoint/2010/main" spd="slow" advClick="0">
-    <p:fade thruBlk="1"/>
-  </p:transition>
-  <p:timing>
-    <p:tnLst>
-      <p:par>
-        <p:cTn xmlns:p14="http://schemas.microsoft.com/office/powerpoint/2010/main" id="1" dur="indefinite" restart="never" nodeType="tmRoot"/>
-      </p:par>
-    </p:tnLst>
-  </p:timing>
-</p:sld>
-</file>
-
-<file path=ppt/slides/slide28.xml><?xml version="1.0" encoding="utf-8"?>
-<p:sld xmlns:a="http://schemas.openxmlformats.org/drawingml/2006/main" xmlns:r="http://schemas.openxmlformats.org/officeDocument/2006/relationships" xmlns:p="http://schemas.openxmlformats.org/presentationml/2006/main">
-  <p:cSld>
-    <p:spTree>
-      <p:nvGrpSpPr>
-        <p:cNvPr id="1" name=""/>
-        <p:cNvGrpSpPr/>
-        <p:nvPr/>
-      </p:nvGrpSpPr>
-      <p:grpSpPr>
-        <a:xfrm>
-          <a:off x="0" y="0"/>
-          <a:ext cx="0" cy="0"/>
-          <a:chOff x="0" y="0"/>
-          <a:chExt cx="0" cy="0"/>
-        </a:xfrm>
-      </p:grpSpPr>
-      <p:sp>
-        <p:nvSpPr>
-          <p:cNvPr id="2" name="Title 1"/>
-          <p:cNvSpPr>
-            <a:spLocks noGrp="1"/>
-          </p:cNvSpPr>
-          <p:nvPr>
-            <p:ph type="title"/>
-          </p:nvPr>
-        </p:nvSpPr>
-        <p:spPr>
-          <a:xfrm>
-            <a:off x="1445702" y="355345"/>
-            <a:ext cx="7261213" cy="958190"/>
-          </a:xfrm>
-        </p:spPr>
-        <p:txBody>
-          <a:bodyPr/>
-          <a:lstStyle/>
-          <a:p>
-            <a:r>
-              <a:rPr lang="en-US" dirty="0" smtClean="0"/>
-              <a:t>Some Axioms of Set Theory</a:t>
-            </a:r>
-            <a:endParaRPr lang="en-US" dirty="0"/>
-          </a:p>
-        </p:txBody>
-      </p:sp>
-      <p:sp>
-        <p:nvSpPr>
-          <p:cNvPr id="8" name="TextBox 7"/>
-          <p:cNvSpPr txBox="1"/>
-          <p:nvPr/>
-        </p:nvSpPr>
-        <p:spPr>
-          <a:xfrm>
-            <a:off x="509774" y="1550831"/>
-            <a:ext cx="2788544" cy="707886"/>
-          </a:xfrm>
-          <a:prstGeom prst="rect">
-            <a:avLst/>
-          </a:prstGeom>
-          <a:noFill/>
-        </p:spPr>
-        <p:txBody>
-          <a:bodyPr wrap="none" rtlCol="0">
-            <a:spAutoFit/>
-          </a:bodyPr>
-          <a:lstStyle/>
-          <a:p>
-            <a:r>
-              <a:rPr lang="en-US" sz="4000" dirty="0" smtClean="0">
-                <a:solidFill>
-                  <a:srgbClr val="9933FF"/>
-                </a:solidFill>
-                <a:latin typeface="Comic Sans MS"/>
-                <a:cs typeface="Comic Sans MS"/>
-              </a:rPr>
-              <a:t>Foundation</a:t>
-            </a:r>
-            <a:endParaRPr lang="en-US" sz="4000" dirty="0" smtClean="0">
-              <a:solidFill>
-                <a:srgbClr val="9933FF"/>
-              </a:solidFill>
-              <a:latin typeface="Comic Sans MS"/>
-              <a:cs typeface="Comic Sans MS"/>
-            </a:endParaRPr>
-          </a:p>
-        </p:txBody>
-      </p:sp>
-      <p:sp>
-        <p:nvSpPr>
-          <p:cNvPr id="3" name="TextBox 2"/>
-          <p:cNvSpPr txBox="1"/>
-          <p:nvPr/>
-        </p:nvSpPr>
-        <p:spPr>
-          <a:xfrm>
-            <a:off x="659740" y="2376286"/>
-            <a:ext cx="7793720" cy="1569660"/>
-          </a:xfrm>
-          <a:prstGeom prst="rect">
-            <a:avLst/>
-          </a:prstGeom>
-          <a:noFill/>
-        </p:spPr>
-        <p:txBody>
-          <a:bodyPr wrap="none" rtlCol="0">
-            <a:spAutoFit/>
-          </a:bodyPr>
-          <a:lstStyle/>
-          <a:p>
-            <a:r>
-              <a:rPr lang="en-US" sz="4800" dirty="0" smtClean="0">
-                <a:latin typeface="Comic Sans MS"/>
-                <a:cs typeface="Comic Sans MS"/>
-              </a:rPr>
-              <a:t>Every nonempty set </a:t>
-            </a:r>
-            <a:r>
-              <a:rPr lang="en-US" sz="4800" dirty="0" smtClean="0">
-                <a:latin typeface="Comic Sans MS"/>
-                <a:cs typeface="Comic Sans MS"/>
-              </a:rPr>
-              <a:t>has</a:t>
-            </a:r>
-          </a:p>
-          <a:p>
-            <a:r>
-              <a:rPr lang="en-US" sz="4800" dirty="0" smtClean="0">
-                <a:latin typeface="Comic Sans MS"/>
-                <a:cs typeface="Comic Sans MS"/>
-              </a:rPr>
-              <a:t>a</a:t>
-            </a:r>
-            <a:r>
-              <a:rPr lang="en-US" sz="4800" dirty="0" smtClean="0">
-                <a:latin typeface="Comic Sans MS"/>
-                <a:cs typeface="Comic Sans MS"/>
-              </a:rPr>
-              <a:t> member-minimal element</a:t>
-            </a:r>
-            <a:endParaRPr lang="en-US" sz="4800" dirty="0" smtClean="0">
-              <a:latin typeface="Comic Sans MS"/>
-              <a:cs typeface="Comic Sans MS"/>
-            </a:endParaRPr>
-          </a:p>
-        </p:txBody>
-      </p:sp>
-      <p:graphicFrame>
-        <p:nvGraphicFramePr>
-          <p:cNvPr id="4" name="Object 3"/>
-          <p:cNvGraphicFramePr>
-            <a:graphicFrameLocks noChangeAspect="1"/>
-          </p:cNvGraphicFramePr>
-          <p:nvPr>
-            <p:extLst>
-              <p:ext uri="{D42A27DB-BD31-4B8C-83A1-F6EECF244321}">
-                <p14:modId xmlns:p14="http://schemas.microsoft.com/office/powerpoint/2010/main" val="1086525349"/>
-              </p:ext>
-            </p:extLst>
-          </p:nvPr>
-        </p:nvGraphicFramePr>
-        <p:xfrm>
-          <a:off x="368916" y="4117975"/>
-          <a:ext cx="8169792" cy="1555974"/>
-        </p:xfrm>
-        <a:graphic>
-          <a:graphicData uri="http://schemas.openxmlformats.org/presentationml/2006/ole">
-            <mc:AlternateContent xmlns:mc="http://schemas.openxmlformats.org/markup-compatibility/2006">
-              <mc:Choice xmlns:v="urn:schemas-microsoft-com:vml" Requires="v">
-                <p:oleObj spid="_x0000_s68610" name="Equation" r:id="rId5" imgW="2400300" imgH="457200" progId="Equation.DSMT4">
-                  <p:embed/>
-                </p:oleObj>
-              </mc:Choice>
-              <mc:Fallback>
-                <p:oleObj name="Equation" r:id="rId5" imgW="2400300" imgH="457200" progId="Equation.DSMT4">
-                  <p:embed/>
-                  <p:pic>
-                    <p:nvPicPr>
-                      <p:cNvPr id="0" name=""/>
-                      <p:cNvPicPr/>
-                      <p:nvPr/>
-                    </p:nvPicPr>
-                    <p:blipFill>
-                      <a:blip r:embed="rId6"/>
-                      <a:stretch>
-                        <a:fillRect/>
-                      </a:stretch>
-                    </p:blipFill>
-                    <p:spPr>
-                      <a:xfrm>
-                        <a:off x="368916" y="4117975"/>
-                        <a:ext cx="8169792" cy="1555974"/>
-                      </a:xfrm>
-                      <a:prstGeom prst="rect">
-                        <a:avLst/>
-                      </a:prstGeom>
-                    </p:spPr>
-                  </p:pic>
-                </p:oleObj>
-              </mc:Fallback>
-            </mc:AlternateContent>
-          </a:graphicData>
-        </a:graphic>
-      </p:graphicFrame>
-    </p:spTree>
-    <p:custDataLst>
-      <p:tags r:id="rId2"/>
-    </p:custDataLst>
-    <p:extLst>
-      <p:ext uri="{BB962C8B-B14F-4D97-AF65-F5344CB8AC3E}">
-        <p14:creationId xmlns:p14="http://schemas.microsoft.com/office/powerpoint/2010/main" val="1017702046"/>
-      </p:ext>
-    </p:extLst>
-  </p:cSld>
-  <p:clrMapOvr>
-    <a:masterClrMapping/>
-  </p:clrMapOvr>
-  <p:transition xmlns:p14="http://schemas.microsoft.com/office/powerpoint/2010/main" spd="slow" advClick="0">
-    <p:fade thruBlk="1"/>
-  </p:transition>
-  <p:timing>
-    <p:tnLst>
-      <p:par>
-        <p:cTn xmlns:p14="http://schemas.microsoft.com/office/powerpoint/2010/main" id="1" dur="indefinite" restart="never" nodeType="tmRoot"/>
-      </p:par>
-    </p:tnLst>
-  </p:timing>
-</p:sld>
-</file>
-
-<file path=ppt/slides/slide29.xml><?xml version="1.0" encoding="utf-8"?>
-<p:sld xmlns:a="http://schemas.openxmlformats.org/drawingml/2006/main" xmlns:r="http://schemas.openxmlformats.org/officeDocument/2006/relationships" xmlns:p="http://schemas.openxmlformats.org/presentationml/2006/main">
-  <p:cSld>
-    <p:spTree>
-      <p:nvGrpSpPr>
-        <p:cNvPr id="1" name=""/>
-        <p:cNvGrpSpPr/>
-        <p:nvPr/>
-      </p:nvGrpSpPr>
-      <p:grpSpPr>
-        <a:xfrm>
-          <a:off x="0" y="0"/>
-          <a:ext cx="0" cy="0"/>
-          <a:chOff x="0" y="0"/>
-          <a:chExt cx="0" cy="0"/>
-        </a:xfrm>
-      </p:grpSpPr>
-      <p:sp>
-        <p:nvSpPr>
-          <p:cNvPr id="3" name="Content Placeholder 2"/>
-          <p:cNvSpPr>
-            <a:spLocks noGrp="1"/>
-          </p:cNvSpPr>
-          <p:nvPr>
-            <p:ph idx="1"/>
-          </p:nvPr>
-        </p:nvSpPr>
-        <p:spPr>
-          <a:xfrm>
-            <a:off x="400049" y="1557337"/>
-            <a:ext cx="8358188" cy="3714750"/>
-          </a:xfrm>
-        </p:spPr>
-        <p:txBody>
-          <a:bodyPr/>
-          <a:lstStyle/>
-          <a:p>
-            <a:r>
-              <a:rPr lang="en-US" dirty="0" smtClean="0"/>
-              <a:t>This implies that</a:t>
-            </a:r>
-          </a:p>
-          <a:p>
-            <a:r>
-              <a:rPr lang="en-US" dirty="0" smtClean="0"/>
-              <a:t>(1) the collection of all sets is</a:t>
-            </a:r>
-            <a:r>
-              <a:rPr lang="en-US" b="1" dirty="0" smtClean="0"/>
-              <a:t> </a:t>
-            </a:r>
-            <a:r>
-              <a:rPr lang="en-US" dirty="0" smtClean="0"/>
-              <a:t>not</a:t>
-            </a:r>
-            <a:r>
-              <a:rPr lang="en-US" b="1" dirty="0" smtClean="0">
-                <a:solidFill>
-                  <a:srgbClr val="FF0000"/>
-                </a:solidFill>
-              </a:rPr>
-              <a:t> </a:t>
-            </a:r>
-            <a:r>
-              <a:rPr lang="en-US" dirty="0" smtClean="0"/>
-              <a:t>a set, and</a:t>
-            </a:r>
-          </a:p>
-          <a:p>
-            <a:r>
-              <a:rPr lang="en-US" dirty="0" smtClean="0"/>
-              <a:t>(2) </a:t>
-            </a:r>
-            <a:r>
-              <a:rPr lang="en-US" dirty="0" smtClean="0">
-                <a:solidFill>
-                  <a:srgbClr val="0000FF"/>
-                </a:solidFill>
-              </a:rPr>
-              <a:t>W</a:t>
-            </a:r>
-            <a:r>
-              <a:rPr lang="en-US" dirty="0" smtClean="0"/>
-              <a:t> equals the collection of all sets </a:t>
-            </a:r>
-            <a:r>
-              <a:rPr lang="en-US" dirty="0" smtClean="0">
-                <a:sym typeface="Euclid Symbol"/>
-              </a:rPr>
-              <a:t>…which is why it’s not a set</a:t>
-            </a:r>
-            <a:endParaRPr lang="en-US" dirty="0" smtClean="0"/>
-          </a:p>
-          <a:p>
-            <a:endParaRPr lang="en-US" dirty="0"/>
-          </a:p>
-        </p:txBody>
-      </p:sp>
-      <p:sp>
-        <p:nvSpPr>
-          <p:cNvPr id="7" name="Title 1"/>
-          <p:cNvSpPr>
-            <a:spLocks noGrp="1"/>
-          </p:cNvSpPr>
-          <p:nvPr>
-            <p:ph type="title"/>
-          </p:nvPr>
-        </p:nvSpPr>
-        <p:spPr/>
-        <p:txBody>
-          <a:bodyPr/>
-          <a:lstStyle/>
-          <a:p>
-            <a:r>
-              <a:rPr lang="en-US" dirty="0" smtClean="0"/>
-              <a:t>Zermelo-Frankel Set Theory</a:t>
-            </a:r>
-            <a:endParaRPr lang="en-US" dirty="0"/>
-          </a:p>
-        </p:txBody>
-      </p:sp>
-    </p:spTree>
-    <p:custDataLst>
-      <p:tags r:id="rId1"/>
-    </p:custDataLst>
-    <p:extLst>
-      <p:ext uri="{BB962C8B-B14F-4D97-AF65-F5344CB8AC3E}">
-        <p14:creationId xmlns:p14="http://schemas.microsoft.com/office/powerpoint/2010/main" val="1282792272"/>
-      </p:ext>
-    </p:extLst>
-  </p:cSld>
-  <p:clrMapOvr>
-    <a:masterClrMapping/>
-  </p:clrMapOvr>
-  <mc:AlternateContent xmlns:mc="http://schemas.openxmlformats.org/markup-compatibility/2006" xmlns:p14="http://schemas.microsoft.com/office/powerpoint/2010/main">
-    <mc:Choice Requires="p14">
-      <p:transition spd="slow" p14:dur="900" advClick="0">
-        <p:fade/>
-      </p:transition>
-    </mc:Choice>
-    <mc:Fallback xmlns="">
-      <p:transition xmlns:p14="http://schemas.microsoft.com/office/powerpoint/2010/main" spd="slow" advClick="0">
-        <p:fade/>
-      </p:transition>
-    </mc:Fallback>
-  </mc:AlternateContent>
-  <p:timing>
-    <p:tnLst>
-      <p:par>
-        <p:cTn xmlns:p14="http://schemas.microsoft.com/office/powerpoint/2010/main" id="1" dur="indefinite" restart="never" nodeType="tmRoot">
-          <p:childTnLst>
-            <p:seq concurrent="1" nextAc="seek">
-              <p:cTn id="2" dur="indefinite" nodeType="mainSeq">
-                <p:childTnLst>
-                  <p:par>
-                    <p:cTn id="3" fill="hold">
-                      <p:stCondLst>
-                        <p:cond delay="indefinite"/>
-                      </p:stCondLst>
-                      <p:childTnLst>
-                        <p:par>
-                          <p:cTn id="4" fill="hold">
-                            <p:stCondLst>
-                              <p:cond delay="0"/>
-                            </p:stCondLst>
-                            <p:childTnLst>
-                              <p:par>
-                                <p:cTn id="5" presetID="9" presetClass="entr" presetSubtype="0" fill="hold" nodeType="clickEffect">
-                                  <p:stCondLst>
-                                    <p:cond delay="0"/>
-                                  </p:stCondLst>
-                                  <p:childTnLst>
-                                    <p:set>
-                                      <p:cBhvr>
-                                        <p:cTn id="6" dur="1" fill="hold">
-                                          <p:stCondLst>
-                                            <p:cond delay="0"/>
-                                          </p:stCondLst>
-                                        </p:cTn>
-                                        <p:tgtEl>
-                                          <p:spTgt spid="3">
-                                            <p:txEl>
-                                              <p:pRg st="2" end="2"/>
-                                            </p:txEl>
-                                          </p:spTgt>
-                                        </p:tgtEl>
-                                        <p:attrNameLst>
-                                          <p:attrName>style.visibility</p:attrName>
-                                        </p:attrNameLst>
-                                      </p:cBhvr>
-                                      <p:to>
-                                        <p:strVal val="visible"/>
-                                      </p:to>
-                                    </p:set>
-                                    <p:animEffect transition="in" filter="dissolve">
-                                      <p:cBhvr>
-                                        <p:cTn id="7" dur="500"/>
-                                        <p:tgtEl>
-                                          <p:spTgt spid="3">
-                                            <p:txEl>
-                                              <p:pRg st="2" end="2"/>
-                                            </p:txEl>
-                                          </p:spTgt>
-                                        </p:tgtEl>
-                                      </p:cBhvr>
-                                    </p:animEffect>
-                                  </p:childTnLst>
-                                </p:cTn>
-                              </p:par>
-                            </p:childTnLst>
-                          </p:cTn>
-                        </p:par>
-                      </p:childTnLst>
-                    </p:cTn>
-                  </p:par>
-                </p:childTnLst>
-              </p:cTn>
-              <p:prevCondLst>
-                <p:cond evt="onPrev" delay="0">
-                  <p:tgtEl>
-                    <p:sldTgt/>
-                  </p:tgtEl>
-                </p:cond>
-              </p:prevCondLst>
-              <p:nextCondLst>
-                <p:cond evt="onNext" delay="0">
-                  <p:tgtEl>
-                    <p:sldTgt/>
-                  </p:tgtEl>
-                </p:cond>
-              </p:nextCondLst>
-            </p:seq>
-          </p:childTnLst>
-        </p:cTn>
-      </p:par>
-    </p:tnLst>
-  </p:timing>
-</p:sld>
-</file>
-
 <file path=ppt/slides/slide3.xml><?xml version="1.0" encoding="utf-8"?>
 <p:sld xmlns:a="http://schemas.openxmlformats.org/drawingml/2006/main" xmlns:r="http://schemas.openxmlformats.org/officeDocument/2006/relationships" xmlns:p="http://schemas.openxmlformats.org/presentationml/2006/main" show="0">
   <p:cSld>
@@ -14002,7 +10283,7 @@
           <a:graphicData uri="http://schemas.openxmlformats.org/presentationml/2006/ole">
             <mc:AlternateContent xmlns:mc="http://schemas.openxmlformats.org/markup-compatibility/2006">
               <mc:Choice xmlns:v="urn:schemas-microsoft-com:vml" Requires="v">
-                <p:oleObj spid="_x0000_s56592" name="Equation" r:id="rId4" imgW="698500" imgH="381000" progId="Equation.DSMT4">
+                <p:oleObj spid="_x0000_s56606" name="Equation" r:id="rId4" imgW="698500" imgH="381000" progId="Equation.DSMT4">
                   <p:embed/>
                 </p:oleObj>
               </mc:Choice>
@@ -14142,7 +10423,7 @@
           <a:graphicData uri="http://schemas.openxmlformats.org/presentationml/2006/ole">
             <mc:AlternateContent xmlns:mc="http://schemas.openxmlformats.org/markup-compatibility/2006">
               <mc:Choice xmlns:v="urn:schemas-microsoft-com:vml" Requires="v">
-                <p:oleObj spid="_x0000_s56593" name="Equation" r:id="rId6" imgW="977900" imgH="330200" progId="Equation.DSMT4">
+                <p:oleObj spid="_x0000_s56607" name="Equation" r:id="rId6" imgW="977900" imgH="330200" progId="Equation.DSMT4">
                   <p:embed/>
                 </p:oleObj>
               </mc:Choice>
@@ -14212,7 +10493,7 @@
           <a:graphicData uri="http://schemas.openxmlformats.org/presentationml/2006/ole">
             <mc:AlternateContent xmlns:mc="http://schemas.openxmlformats.org/markup-compatibility/2006">
               <mc:Choice xmlns:v="urn:schemas-microsoft-com:vml" Requires="v">
-                <p:oleObj spid="_x0000_s56594" name="Equation" r:id="rId8" imgW="965200" imgH="330200" progId="Equation.DSMT4">
+                <p:oleObj spid="_x0000_s56608" name="Equation" r:id="rId8" imgW="965200" imgH="330200" progId="Equation.DSMT4">
                   <p:embed/>
                 </p:oleObj>
               </mc:Choice>
@@ -14282,7 +10563,7 @@
           <a:graphicData uri="http://schemas.openxmlformats.org/presentationml/2006/ole">
             <mc:AlternateContent xmlns:mc="http://schemas.openxmlformats.org/markup-compatibility/2006">
               <mc:Choice xmlns:v="urn:schemas-microsoft-com:vml" Requires="v">
-                <p:oleObj spid="_x0000_s56595" name="Equation" r:id="rId10" imgW="647700" imgH="381000" progId="Equation.DSMT4">
+                <p:oleObj spid="_x0000_s56609" name="Equation" r:id="rId10" imgW="647700" imgH="381000" progId="Equation.DSMT4">
                   <p:embed/>
                 </p:oleObj>
               </mc:Choice>
@@ -14797,7 +11078,7 @@
           <a:graphicData uri="http://schemas.openxmlformats.org/presentationml/2006/ole">
             <mc:AlternateContent xmlns:mc="http://schemas.openxmlformats.org/markup-compatibility/2006">
               <mc:Choice xmlns:v="urn:schemas-microsoft-com:vml" Requires="v">
-                <p:oleObj spid="_x0000_s57494" name="Equation" r:id="rId4" imgW="1524000" imgH="406400" progId="Equation.DSMT4">
+                <p:oleObj spid="_x0000_s57502" name="Equation" r:id="rId4" imgW="1524000" imgH="406400" progId="Equation.DSMT4">
                   <p:embed/>
                 </p:oleObj>
               </mc:Choice>
@@ -14861,7 +11142,7 @@
           <a:graphicData uri="http://schemas.openxmlformats.org/presentationml/2006/ole">
             <mc:AlternateContent xmlns:mc="http://schemas.openxmlformats.org/markup-compatibility/2006">
               <mc:Choice xmlns:v="urn:schemas-microsoft-com:vml" Requires="v">
-                <p:oleObj spid="_x0000_s57495" name="Equation" r:id="rId6" imgW="1384200" imgH="266400" progId="Equation.DSMT4">
+                <p:oleObj spid="_x0000_s57503" name="Equation" r:id="rId6" imgW="1384200" imgH="266400" progId="Equation.DSMT4">
                   <p:embed/>
                 </p:oleObj>
               </mc:Choice>
@@ -21355,36 +17636,6 @@
 </p:tagLst>
 </file>
 
-<file path=ppt/tags/tag10.xml><?xml version="1.0" encoding="utf-8"?>
-<p:tagLst xmlns:a="http://schemas.openxmlformats.org/drawingml/2006/main" xmlns:r="http://schemas.openxmlformats.org/officeDocument/2006/relationships" xmlns:p="http://schemas.openxmlformats.org/presentationml/2006/main">
-  <p:tag name="TIMING" val="|91.8|1.5|35.8|16.4"/>
-</p:tagLst>
-</file>
-
-<file path=ppt/tags/tag11.xml><?xml version="1.0" encoding="utf-8"?>
-<p:tagLst xmlns:a="http://schemas.openxmlformats.org/drawingml/2006/main" xmlns:r="http://schemas.openxmlformats.org/officeDocument/2006/relationships" xmlns:p="http://schemas.openxmlformats.org/presentationml/2006/main">
-  <p:tag name="TIMING" val="|91.8|1.5|35.8|16.4"/>
-</p:tagLst>
-</file>
-
-<file path=ppt/tags/tag12.xml><?xml version="1.0" encoding="utf-8"?>
-<p:tagLst xmlns:a="http://schemas.openxmlformats.org/drawingml/2006/main" xmlns:r="http://schemas.openxmlformats.org/officeDocument/2006/relationships" xmlns:p="http://schemas.openxmlformats.org/presentationml/2006/main">
-  <p:tag name="TIMING" val="|91.8|1.5|35.8|16.4"/>
-</p:tagLst>
-</file>
-
-<file path=ppt/tags/tag13.xml><?xml version="1.0" encoding="utf-8"?>
-<p:tagLst xmlns:a="http://schemas.openxmlformats.org/drawingml/2006/main" xmlns:r="http://schemas.openxmlformats.org/officeDocument/2006/relationships" xmlns:p="http://schemas.openxmlformats.org/presentationml/2006/main">
-  <p:tag name="TIMING" val="|91.8|1.5|35.8|16.4"/>
-</p:tagLst>
-</file>
-
-<file path=ppt/tags/tag14.xml><?xml version="1.0" encoding="utf-8"?>
-<p:tagLst xmlns:a="http://schemas.openxmlformats.org/drawingml/2006/main" xmlns:r="http://schemas.openxmlformats.org/officeDocument/2006/relationships" xmlns:p="http://schemas.openxmlformats.org/presentationml/2006/main">
-  <p:tag name="TIMING" val="|15.8"/>
-</p:tagLst>
-</file>
-
 <file path=ppt/tags/tag2.xml><?xml version="1.0" encoding="utf-8"?>
 <p:tagLst xmlns:a="http://schemas.openxmlformats.org/drawingml/2006/main" xmlns:r="http://schemas.openxmlformats.org/officeDocument/2006/relationships" xmlns:p="http://schemas.openxmlformats.org/presentationml/2006/main">
   <p:tag name="TIMING" val="|99.7|7.9|10.1|7.7"/>
@@ -21406,30 +17657,6 @@
 <file path=ppt/tags/tag5.xml><?xml version="1.0" encoding="utf-8"?>
 <p:tagLst xmlns:a="http://schemas.openxmlformats.org/drawingml/2006/main" xmlns:r="http://schemas.openxmlformats.org/officeDocument/2006/relationships" xmlns:p="http://schemas.openxmlformats.org/presentationml/2006/main">
   <p:tag name="TIMING" val="|50.8"/>
-</p:tagLst>
-</file>
-
-<file path=ppt/tags/tag6.xml><?xml version="1.0" encoding="utf-8"?>
-<p:tagLst xmlns:a="http://schemas.openxmlformats.org/drawingml/2006/main" xmlns:r="http://schemas.openxmlformats.org/officeDocument/2006/relationships" xmlns:p="http://schemas.openxmlformats.org/presentationml/2006/main">
-  <p:tag name="TIMING" val="|91.8|1.5|35.8|16.4"/>
-</p:tagLst>
-</file>
-
-<file path=ppt/tags/tag7.xml><?xml version="1.0" encoding="utf-8"?>
-<p:tagLst xmlns:a="http://schemas.openxmlformats.org/drawingml/2006/main" xmlns:r="http://schemas.openxmlformats.org/officeDocument/2006/relationships" xmlns:p="http://schemas.openxmlformats.org/presentationml/2006/main">
-  <p:tag name="TIMING" val="|91.8|1.5|35.8|16.4"/>
-</p:tagLst>
-</file>
-
-<file path=ppt/tags/tag8.xml><?xml version="1.0" encoding="utf-8"?>
-<p:tagLst xmlns:a="http://schemas.openxmlformats.org/drawingml/2006/main" xmlns:r="http://schemas.openxmlformats.org/officeDocument/2006/relationships" xmlns:p="http://schemas.openxmlformats.org/presentationml/2006/main">
-  <p:tag name="TIMING" val="|91.8|1.5|35.8|16.4"/>
-</p:tagLst>
-</file>
-
-<file path=ppt/tags/tag9.xml><?xml version="1.0" encoding="utf-8"?>
-<p:tagLst xmlns:a="http://schemas.openxmlformats.org/drawingml/2006/main" xmlns:r="http://schemas.openxmlformats.org/officeDocument/2006/relationships" xmlns:p="http://schemas.openxmlformats.org/presentationml/2006/main">
-  <p:tag name="TIMING" val="|91.8|1.5|35.8|16.4"/>
 </p:tagLst>
 </file>
 

</xml_diff>